<commit_message>
added slide notes to pptx output
</commit_message>
<xml_diff>
--- a/llm-simple.pptx
+++ b/llm-simple.pptx
@@ -6,19 +6,20 @@
   </p:sldMasterIdLst>
   <p:sldIdLst>
     <p:sldId id="256" r:id="rId7"/>
-    <p:sldId id="257" r:id="rId8"/>
-    <p:sldId id="258" r:id="rId9"/>
-    <p:sldId id="259" r:id="rId10"/>
-    <p:sldId id="260" r:id="rId11"/>
-    <p:sldId id="261" r:id="rId12"/>
-    <p:sldId id="262" r:id="rId13"/>
-    <p:sldId id="263" r:id="rId14"/>
-    <p:sldId id="264" r:id="rId15"/>
-    <p:sldId id="265" r:id="rId16"/>
-    <p:sldId id="266" r:id="rId17"/>
-    <p:sldId id="267" r:id="rId18"/>
-    <p:sldId id="268" r:id="rId19"/>
-    <p:sldId id="269" r:id="rId20"/>
+    <p:sldId id="257" r:id="rId9"/>
+    <p:sldId id="258" r:id="rId10"/>
+    <p:sldId id="259" r:id="rId11"/>
+    <p:sldId id="260" r:id="rId12"/>
+    <p:sldId id="261" r:id="rId13"/>
+    <p:sldId id="262" r:id="rId14"/>
+    <p:sldId id="263" r:id="rId15"/>
+    <p:sldId id="264" r:id="rId16"/>
+    <p:sldId id="265" r:id="rId17"/>
+    <p:sldId id="266" r:id="rId18"/>
+    <p:sldId id="267" r:id="rId19"/>
+    <p:sldId id="268" r:id="rId20"/>
+    <p:sldId id="269" r:id="rId21"/>
+    <p:sldId id="270" r:id="rId22"/>
   </p:sldIdLst>
   <p:sldSz cx="9144000" cy="6858000" type="screen4x3"/>
   <p:notesSz cx="6858000" cy="9144000"/>
@@ -118,6 +119,1406 @@
     </a:lvl9pPr>
   </p:defaultTextStyle>
 </p:presentation>
+</file>
+
+<file path=ppt/notesMasters/notesMaster1.xml><?xml version="1.0" encoding="utf-8"?>
+<p:notesMaster xmlns:a="http://schemas.openxmlformats.org/drawingml/2006/main" xmlns:p="http://schemas.openxmlformats.org/presentationml/2006/main" xmlns:r="http://schemas.openxmlformats.org/officeDocument/2006/relationships">
+  <p:cSld>
+    <p:bg>
+      <p:bgRef idx="1001">
+        <a:schemeClr val="bg1"/>
+      </p:bgRef>
+    </p:bg>
+    <p:spTree>
+      <p:nvGrpSpPr>
+        <p:cNvPr id="1" name=""/>
+        <p:cNvGrpSpPr/>
+        <p:nvPr/>
+      </p:nvGrpSpPr>
+      <p:grpSpPr>
+        <a:xfrm>
+          <a:off x="0" y="0"/>
+          <a:ext cx="0" cy="0"/>
+          <a:chOff x="0" y="0"/>
+          <a:chExt cx="0" cy="0"/>
+        </a:xfrm>
+      </p:grpSpPr>
+      <p:sp>
+        <p:nvSpPr>
+          <p:cNvPr id="2" name="Header Placeholder 1"/>
+          <p:cNvSpPr>
+            <a:spLocks noGrp="1"/>
+          </p:cNvSpPr>
+          <p:nvPr>
+            <p:ph type="hdr" sz="quarter"/>
+          </p:nvPr>
+        </p:nvSpPr>
+        <p:spPr>
+          <a:xfrm>
+            <a:off x="0" y="0"/>
+            <a:ext cx="2971800" cy="457200"/>
+          </a:xfrm>
+          <a:prstGeom prst="rect">
+            <a:avLst/>
+          </a:prstGeom>
+        </p:spPr>
+        <p:txBody>
+          <a:bodyPr vert="horz" lIns="91440" tIns="45720" rIns="91440" bIns="45720" rtlCol="0"/>
+          <a:lstStyle>
+            <a:lvl1pPr algn="l">
+              <a:defRPr sz="1200"/>
+            </a:lvl1pPr>
+          </a:lstStyle>
+          <a:p>
+            <a:endParaRPr lang="en-US"/>
+          </a:p>
+        </p:txBody>
+      </p:sp>
+      <p:sp>
+        <p:nvSpPr>
+          <p:cNvPr id="3" name="Date Placeholder 2"/>
+          <p:cNvSpPr>
+            <a:spLocks noGrp="1"/>
+          </p:cNvSpPr>
+          <p:nvPr>
+            <p:ph type="dt" idx="1"/>
+          </p:nvPr>
+        </p:nvSpPr>
+        <p:spPr>
+          <a:xfrm>
+            <a:off x="3884613" y="0"/>
+            <a:ext cx="2971800" cy="457200"/>
+          </a:xfrm>
+          <a:prstGeom prst="rect">
+            <a:avLst/>
+          </a:prstGeom>
+        </p:spPr>
+        <p:txBody>
+          <a:bodyPr vert="horz" lIns="91440" tIns="45720" rIns="91440" bIns="45720" rtlCol="0"/>
+          <a:lstStyle>
+            <a:lvl1pPr algn="r">
+              <a:defRPr sz="1200"/>
+            </a:lvl1pPr>
+          </a:lstStyle>
+          <a:p>
+            <a:fld id="{0F89C1C7-3DCD-1040-A9CF-14679D8B5DDD}" type="datetimeFigureOut">
+              <a:rPr lang="en-US" smtClean="0"/>
+              <a:t>10/17/16</a:t>
+            </a:fld>
+            <a:endParaRPr lang="en-US"/>
+          </a:p>
+        </p:txBody>
+      </p:sp>
+      <p:sp>
+        <p:nvSpPr>
+          <p:cNvPr id="4" name="Slide Image Placeholder 3"/>
+          <p:cNvSpPr>
+            <a:spLocks noGrp="1" noRot="1" noChangeAspect="1"/>
+          </p:cNvSpPr>
+          <p:nvPr>
+            <p:ph type="sldImg" idx="2"/>
+          </p:nvPr>
+        </p:nvSpPr>
+        <p:spPr>
+          <a:xfrm>
+            <a:off x="1143000" y="685800"/>
+            <a:ext cx="4572000" cy="3429000"/>
+          </a:xfrm>
+          <a:prstGeom prst="rect">
+            <a:avLst/>
+          </a:prstGeom>
+          <a:noFill/>
+          <a:ln w="12700">
+            <a:solidFill>
+              <a:prstClr val="black"/>
+            </a:solidFill>
+          </a:ln>
+        </p:spPr>
+        <p:txBody>
+          <a:bodyPr vert="horz" lIns="91440" tIns="45720" rIns="91440" bIns="45720" rtlCol="0" anchor="ctr"/>
+          <a:lstStyle/>
+          <a:p>
+            <a:endParaRPr lang="en-US"/>
+          </a:p>
+        </p:txBody>
+      </p:sp>
+      <p:sp>
+        <p:nvSpPr>
+          <p:cNvPr id="5" name="Notes Placeholder 4"/>
+          <p:cNvSpPr>
+            <a:spLocks noGrp="1"/>
+          </p:cNvSpPr>
+          <p:nvPr>
+            <p:ph type="body" sz="quarter" idx="3"/>
+          </p:nvPr>
+        </p:nvSpPr>
+        <p:spPr>
+          <a:xfrm>
+            <a:off x="685800" y="4343400"/>
+            <a:ext cx="5486400" cy="4114800"/>
+          </a:xfrm>
+          <a:prstGeom prst="rect">
+            <a:avLst/>
+          </a:prstGeom>
+        </p:spPr>
+        <p:txBody>
+          <a:bodyPr vert="horz" lIns="91440" tIns="45720" rIns="91440" bIns="45720" rtlCol="0"/>
+          <a:lstStyle/>
+          <a:p>
+            <a:pPr lvl="0"/>
+            <a:r>
+              <a:rPr lang="en-US" smtClean="0"/>
+              <a:t>Click to edit Master text styles</a:t>
+            </a:r>
+          </a:p>
+          <a:p>
+            <a:pPr lvl="1"/>
+            <a:r>
+              <a:rPr lang="en-US" smtClean="0"/>
+              <a:t>Second level</a:t>
+            </a:r>
+          </a:p>
+          <a:p>
+            <a:pPr lvl="2"/>
+            <a:r>
+              <a:rPr lang="en-US" smtClean="0"/>
+              <a:t>Third level</a:t>
+            </a:r>
+          </a:p>
+          <a:p>
+            <a:pPr lvl="3"/>
+            <a:r>
+              <a:rPr lang="en-US" smtClean="0"/>
+              <a:t>Fourth level</a:t>
+            </a:r>
+          </a:p>
+          <a:p>
+            <a:pPr lvl="4"/>
+            <a:r>
+              <a:rPr lang="en-US" smtClean="0"/>
+              <a:t>Fifth level</a:t>
+            </a:r>
+            <a:endParaRPr lang="en-US"/>
+          </a:p>
+        </p:txBody>
+      </p:sp>
+      <p:sp>
+        <p:nvSpPr>
+          <p:cNvPr id="6" name="Footer Placeholder 5"/>
+          <p:cNvSpPr>
+            <a:spLocks noGrp="1"/>
+          </p:cNvSpPr>
+          <p:nvPr>
+            <p:ph type="ftr" sz="quarter" idx="4"/>
+          </p:nvPr>
+        </p:nvSpPr>
+        <p:spPr>
+          <a:xfrm>
+            <a:off x="0" y="8685213"/>
+            <a:ext cx="2971800" cy="457200"/>
+          </a:xfrm>
+          <a:prstGeom prst="rect">
+            <a:avLst/>
+          </a:prstGeom>
+        </p:spPr>
+        <p:txBody>
+          <a:bodyPr vert="horz" lIns="91440" tIns="45720" rIns="91440" bIns="45720" rtlCol="0" anchor="b"/>
+          <a:lstStyle>
+            <a:lvl1pPr algn="l">
+              <a:defRPr sz="1200"/>
+            </a:lvl1pPr>
+          </a:lstStyle>
+          <a:p>
+            <a:endParaRPr lang="en-US"/>
+          </a:p>
+        </p:txBody>
+      </p:sp>
+      <p:sp>
+        <p:nvSpPr>
+          <p:cNvPr id="7" name="Slide Number Placeholder 6"/>
+          <p:cNvSpPr>
+            <a:spLocks noGrp="1"/>
+          </p:cNvSpPr>
+          <p:nvPr>
+            <p:ph type="sldNum" sz="quarter" idx="5"/>
+          </p:nvPr>
+        </p:nvSpPr>
+        <p:spPr>
+          <a:xfrm>
+            <a:off x="3884613" y="8685213"/>
+            <a:ext cx="2971800" cy="457200"/>
+          </a:xfrm>
+          <a:prstGeom prst="rect">
+            <a:avLst/>
+          </a:prstGeom>
+        </p:spPr>
+        <p:txBody>
+          <a:bodyPr vert="horz" lIns="91440" tIns="45720" rIns="91440" bIns="45720" rtlCol="0" anchor="b"/>
+          <a:lstStyle>
+            <a:lvl1pPr algn="r">
+              <a:defRPr sz="1200"/>
+            </a:lvl1pPr>
+          </a:lstStyle>
+          <a:p>
+            <a:fld id="{BB5E49A5-4136-284D-997B-48E1D791AD67}" type="slidenum">
+              <a:rPr lang="en-US" smtClean="0"/>
+              <a:t>‹#›</a:t>
+            </a:fld>
+            <a:endParaRPr lang="en-US"/>
+          </a:p>
+        </p:txBody>
+      </p:sp>
+    </p:spTree>
+    <p:extLst>
+      <p:ext uri="{BB962C8B-B14F-4D97-AF65-F5344CB8AC3E}">
+        <p14:creationId xmlns:p14="http://schemas.microsoft.com/office/powerpoint/2010/main" val="2623252185"/>
+      </p:ext>
+    </p:extLst>
+  </p:cSld>
+  <p:clrMap bg1="lt1" tx1="dk1" bg2="lt2" tx2="dk2" accent1="accent1" accent2="accent2" accent3="accent3" accent4="accent4" accent5="accent5" accent6="accent6" hlink="hlink" folHlink="folHlink"/>
+  <p:notesStyle>
+    <a:lvl1pPr marL="0" algn="l" defTabSz="457200" rtl="0" eaLnBrk="1" latinLnBrk="0" hangingPunct="1">
+      <a:defRPr sz="1200" kern="1200">
+        <a:solidFill>
+          <a:schemeClr val="tx1"/>
+        </a:solidFill>
+        <a:latin typeface="+mn-lt"/>
+        <a:ea typeface="+mn-ea"/>
+        <a:cs typeface="+mn-cs"/>
+      </a:defRPr>
+    </a:lvl1pPr>
+    <a:lvl2pPr marL="457200" algn="l" defTabSz="457200" rtl="0" eaLnBrk="1" latinLnBrk="0" hangingPunct="1">
+      <a:defRPr sz="1200" kern="1200">
+        <a:solidFill>
+          <a:schemeClr val="tx1"/>
+        </a:solidFill>
+        <a:latin typeface="+mn-lt"/>
+        <a:ea typeface="+mn-ea"/>
+        <a:cs typeface="+mn-cs"/>
+      </a:defRPr>
+    </a:lvl2pPr>
+    <a:lvl3pPr marL="914400" algn="l" defTabSz="457200" rtl="0" eaLnBrk="1" latinLnBrk="0" hangingPunct="1">
+      <a:defRPr sz="1200" kern="1200">
+        <a:solidFill>
+          <a:schemeClr val="tx1"/>
+        </a:solidFill>
+        <a:latin typeface="+mn-lt"/>
+        <a:ea typeface="+mn-ea"/>
+        <a:cs typeface="+mn-cs"/>
+      </a:defRPr>
+    </a:lvl3pPr>
+    <a:lvl4pPr marL="1371600" algn="l" defTabSz="457200" rtl="0" eaLnBrk="1" latinLnBrk="0" hangingPunct="1">
+      <a:defRPr sz="1200" kern="1200">
+        <a:solidFill>
+          <a:schemeClr val="tx1"/>
+        </a:solidFill>
+        <a:latin typeface="+mn-lt"/>
+        <a:ea typeface="+mn-ea"/>
+        <a:cs typeface="+mn-cs"/>
+      </a:defRPr>
+    </a:lvl4pPr>
+    <a:lvl5pPr marL="1828800" algn="l" defTabSz="457200" rtl="0" eaLnBrk="1" latinLnBrk="0" hangingPunct="1">
+      <a:defRPr sz="1200" kern="1200">
+        <a:solidFill>
+          <a:schemeClr val="tx1"/>
+        </a:solidFill>
+        <a:latin typeface="+mn-lt"/>
+        <a:ea typeface="+mn-ea"/>
+        <a:cs typeface="+mn-cs"/>
+      </a:defRPr>
+    </a:lvl5pPr>
+    <a:lvl6pPr marL="2286000" algn="l" defTabSz="457200" rtl="0" eaLnBrk="1" latinLnBrk="0" hangingPunct="1">
+      <a:defRPr sz="1200" kern="1200">
+        <a:solidFill>
+          <a:schemeClr val="tx1"/>
+        </a:solidFill>
+        <a:latin typeface="+mn-lt"/>
+        <a:ea typeface="+mn-ea"/>
+        <a:cs typeface="+mn-cs"/>
+      </a:defRPr>
+    </a:lvl6pPr>
+    <a:lvl7pPr marL="2743200" algn="l" defTabSz="457200" rtl="0" eaLnBrk="1" latinLnBrk="0" hangingPunct="1">
+      <a:defRPr sz="1200" kern="1200">
+        <a:solidFill>
+          <a:schemeClr val="tx1"/>
+        </a:solidFill>
+        <a:latin typeface="+mn-lt"/>
+        <a:ea typeface="+mn-ea"/>
+        <a:cs typeface="+mn-cs"/>
+      </a:defRPr>
+    </a:lvl7pPr>
+    <a:lvl8pPr marL="3200400" algn="l" defTabSz="457200" rtl="0" eaLnBrk="1" latinLnBrk="0" hangingPunct="1">
+      <a:defRPr sz="1200" kern="1200">
+        <a:solidFill>
+          <a:schemeClr val="tx1"/>
+        </a:solidFill>
+        <a:latin typeface="+mn-lt"/>
+        <a:ea typeface="+mn-ea"/>
+        <a:cs typeface="+mn-cs"/>
+      </a:defRPr>
+    </a:lvl8pPr>
+    <a:lvl9pPr marL="3657600" algn="l" defTabSz="457200" rtl="0" eaLnBrk="1" latinLnBrk="0" hangingPunct="1">
+      <a:defRPr sz="1200" kern="1200">
+        <a:solidFill>
+          <a:schemeClr val="tx1"/>
+        </a:solidFill>
+        <a:latin typeface="+mn-lt"/>
+        <a:ea typeface="+mn-ea"/>
+        <a:cs typeface="+mn-cs"/>
+      </a:defRPr>
+    </a:lvl9pPr>
+  </p:notesStyle>
+</p:notesMaster>
+</file>
+
+<file path=ppt/notesSlides/notesSlide1.xml><?xml version="1.0" encoding="utf-8"?>
+<p:notes xmlns:a="http://schemas.openxmlformats.org/drawingml/2006/main" xmlns:p="http://schemas.openxmlformats.org/presentationml/2006/main" xmlns:r="http://schemas.openxmlformats.org/officeDocument/2006/relationships">
+  <p:cSld>
+    <p:spTree>
+      <p:nvGrpSpPr>
+        <p:cNvPr id="1" name=""/>
+        <p:cNvGrpSpPr/>
+        <p:nvPr/>
+      </p:nvGrpSpPr>
+      <p:grpSpPr>
+        <a:xfrm>
+          <a:off x="0" y="0"/>
+          <a:ext cx="0" cy="0"/>
+          <a:chOff x="0" y="0"/>
+          <a:chExt cx="0" cy="0"/>
+        </a:xfrm>
+      </p:grpSpPr>
+      <p:sp>
+        <p:nvSpPr>
+          <p:cNvPr id="2" name="Slide Image Placeholder 1"/>
+          <p:cNvSpPr>
+            <a:spLocks noGrp="1"/>
+          </p:cNvSpPr>
+          <p:nvPr>
+            <p:ph type="sldImg" idx="2"/>
+          </p:nvPr>
+        </p:nvSpPr>
+        <p:spPr/>
+      </p:sp>
+      <p:sp>
+        <p:nvSpPr>
+          <p:cNvPr id="3" name="Notes Placeholder 2"/>
+          <p:cNvSpPr>
+            <a:spLocks noGrp="1"/>
+          </p:cNvSpPr>
+          <p:nvPr>
+            <p:ph type="body" idx="3" sz="quarter"/>
+          </p:nvPr>
+        </p:nvSpPr>
+        <p:spPr/>
+        <p:txBody>
+          <a:bodyPr/>
+          <a:lstStyle/>
+          <a:p>
+            <a:r>
+              <a:t>Welcome to this presentation on How Language AI Works. This is a simple guide to help you understand how artificial intelligence generates text.</a:t>
+            </a:r>
+          </a:p>
+        </p:txBody>
+      </p:sp>
+      <p:sp>
+        <p:nvSpPr>
+          <p:cNvPr id="4" name="Slide Number Placeholder 3"/>
+          <p:cNvSpPr>
+            <a:spLocks noGrp="1"/>
+          </p:cNvSpPr>
+          <p:nvPr>
+            <p:ph type="sldNum" idx="5" sz="quarter"/>
+          </p:nvPr>
+        </p:nvSpPr>
+        <p:spPr/>
+      </p:sp>
+    </p:spTree>
+  </p:cSld>
+  <p:clrMapOvr>
+    <a:masterClrMapping/>
+  </p:clrMapOvr>
+</p:notes>
+</file>
+
+<file path=ppt/notesSlides/notesSlide10.xml><?xml version="1.0" encoding="utf-8"?>
+<p:notes xmlns:a="http://schemas.openxmlformats.org/drawingml/2006/main" xmlns:p="http://schemas.openxmlformats.org/presentationml/2006/main" xmlns:r="http://schemas.openxmlformats.org/officeDocument/2006/relationships">
+  <p:cSld>
+    <p:spTree>
+      <p:nvGrpSpPr>
+        <p:cNvPr id="1" name=""/>
+        <p:cNvGrpSpPr/>
+        <p:nvPr/>
+      </p:nvGrpSpPr>
+      <p:grpSpPr>
+        <a:xfrm>
+          <a:off x="0" y="0"/>
+          <a:ext cx="0" cy="0"/>
+          <a:chOff x="0" y="0"/>
+          <a:chExt cx="0" cy="0"/>
+        </a:xfrm>
+      </p:grpSpPr>
+      <p:sp>
+        <p:nvSpPr>
+          <p:cNvPr id="2" name="Slide Image Placeholder 1"/>
+          <p:cNvSpPr>
+            <a:spLocks noGrp="1"/>
+          </p:cNvSpPr>
+          <p:nvPr>
+            <p:ph type="sldImg" idx="2"/>
+          </p:nvPr>
+        </p:nvSpPr>
+        <p:spPr/>
+      </p:sp>
+      <p:sp>
+        <p:nvSpPr>
+          <p:cNvPr id="3" name="Notes Placeholder 2"/>
+          <p:cNvSpPr>
+            <a:spLocks noGrp="1"/>
+          </p:cNvSpPr>
+          <p:nvPr>
+            <p:ph type="body" idx="3" sz="quarter"/>
+          </p:nvPr>
+        </p:nvSpPr>
+        <p:spPr/>
+        <p:txBody>
+          <a:bodyPr/>
+          <a:lstStyle/>
+          <a:p>
+            <a:r>
+              <a:t>After all the processing layers, the AI's final understanding needs to be converted into possible next words. In the projection step, every word in the AI's vocabulary receives a score. Higher scores indicate words that are more likely to be the next word in the sequence. It's like having thousands of options ranked by the AI's confidence level. This creates a ranked list of possibilities for what should come next.</a:t>
+            </a:r>
+          </a:p>
+        </p:txBody>
+      </p:sp>
+      <p:sp>
+        <p:nvSpPr>
+          <p:cNvPr id="4" name="Slide Number Placeholder 3"/>
+          <p:cNvSpPr>
+            <a:spLocks noGrp="1"/>
+          </p:cNvSpPr>
+          <p:nvPr>
+            <p:ph type="sldNum" idx="5" sz="quarter"/>
+          </p:nvPr>
+        </p:nvSpPr>
+        <p:spPr/>
+      </p:sp>
+    </p:spTree>
+  </p:cSld>
+  <p:clrMapOvr>
+    <a:masterClrMapping/>
+  </p:clrMapOvr>
+</p:notes>
+</file>
+
+<file path=ppt/notesSlides/notesSlide11.xml><?xml version="1.0" encoding="utf-8"?>
+<p:notes xmlns:a="http://schemas.openxmlformats.org/drawingml/2006/main" xmlns:p="http://schemas.openxmlformats.org/presentationml/2006/main" xmlns:r="http://schemas.openxmlformats.org/officeDocument/2006/relationships">
+  <p:cSld>
+    <p:spTree>
+      <p:nvGrpSpPr>
+        <p:cNvPr id="1" name=""/>
+        <p:cNvGrpSpPr/>
+        <p:nvPr/>
+      </p:nvGrpSpPr>
+      <p:grpSpPr>
+        <a:xfrm>
+          <a:off x="0" y="0"/>
+          <a:ext cx="0" cy="0"/>
+          <a:chOff x="0" y="0"/>
+          <a:chExt cx="0" cy="0"/>
+        </a:xfrm>
+      </p:grpSpPr>
+      <p:sp>
+        <p:nvSpPr>
+          <p:cNvPr id="2" name="Slide Image Placeholder 1"/>
+          <p:cNvSpPr>
+            <a:spLocks noGrp="1"/>
+          </p:cNvSpPr>
+          <p:nvPr>
+            <p:ph type="sldImg" idx="2"/>
+          </p:nvPr>
+        </p:nvSpPr>
+        <p:spPr/>
+      </p:sp>
+      <p:sp>
+        <p:nvSpPr>
+          <p:cNvPr id="3" name="Notes Placeholder 2"/>
+          <p:cNvSpPr>
+            <a:spLocks noGrp="1"/>
+          </p:cNvSpPr>
+          <p:nvPr>
+            <p:ph type="body" idx="3" sz="quarter"/>
+          </p:nvPr>
+        </p:nvSpPr>
+        <p:spPr/>
+        <p:txBody>
+          <a:bodyPr/>
+          <a:lstStyle/>
+          <a:p>
+            <a:r>
+              <a:t>The softmax function converts the raw scores from projection into probabilities. These scores are transformed into percentages that all add up to 100 percent. This shows exactly how confident the AI is about each possible next word. The softmax output can be adjusted to make the AI more creative or more predictable. More randomness in the selection leads to more creative but less predictable outputs.</a:t>
+            </a:r>
+          </a:p>
+        </p:txBody>
+      </p:sp>
+      <p:sp>
+        <p:nvSpPr>
+          <p:cNvPr id="4" name="Slide Number Placeholder 3"/>
+          <p:cNvSpPr>
+            <a:spLocks noGrp="1"/>
+          </p:cNvSpPr>
+          <p:nvPr>
+            <p:ph type="sldNum" idx="5" sz="quarter"/>
+          </p:nvPr>
+        </p:nvSpPr>
+        <p:spPr/>
+      </p:sp>
+    </p:spTree>
+  </p:cSld>
+  <p:clrMapOvr>
+    <a:masterClrMapping/>
+  </p:clrMapOvr>
+</p:notes>
+</file>
+
+<file path=ppt/notesSlides/notesSlide12.xml><?xml version="1.0" encoding="utf-8"?>
+<p:notes xmlns:a="http://schemas.openxmlformats.org/drawingml/2006/main" xmlns:p="http://schemas.openxmlformats.org/presentationml/2006/main" xmlns:r="http://schemas.openxmlformats.org/officeDocument/2006/relationships">
+  <p:cSld>
+    <p:spTree>
+      <p:nvGrpSpPr>
+        <p:cNvPr id="1" name=""/>
+        <p:cNvGrpSpPr/>
+        <p:nvPr/>
+      </p:nvGrpSpPr>
+      <p:grpSpPr>
+        <a:xfrm>
+          <a:off x="0" y="0"/>
+          <a:ext cx="0" cy="0"/>
+          <a:chOff x="0" y="0"/>
+          <a:chExt cx="0" cy="0"/>
+        </a:xfrm>
+      </p:grpSpPr>
+      <p:sp>
+        <p:nvSpPr>
+          <p:cNvPr id="2" name="Slide Image Placeholder 1"/>
+          <p:cNvSpPr>
+            <a:spLocks noGrp="1"/>
+          </p:cNvSpPr>
+          <p:nvPr>
+            <p:ph type="sldImg" idx="2"/>
+          </p:nvPr>
+        </p:nvSpPr>
+        <p:spPr/>
+      </p:sp>
+      <p:sp>
+        <p:nvSpPr>
+          <p:cNvPr id="3" name="Notes Placeholder 2"/>
+          <p:cNvSpPr>
+            <a:spLocks noGrp="1"/>
+          </p:cNvSpPr>
+          <p:nvPr>
+            <p:ph type="body" idx="3" sz="quarter"/>
+          </p:nvPr>
+        </p:nvSpPr>
+        <p:spPr/>
+        <p:txBody>
+          <a:bodyPr/>
+          <a:lstStyle/>
+          <a:p>
+            <a:r>
+              <a:t>Once we have probabilities, the AI must decide which word to actually output. There are different approaches to making this decision. The argmax method picks the most likely word, which is safe and predictable. The sampling method chooses randomly from the top candidates, which produces more creative results. Most systems strike a balance between creativity and accuracy. Predictable selection is consistent but can be boring, while random selection is interesting but sometimes makes mistakes.</a:t>
+            </a:r>
+          </a:p>
+        </p:txBody>
+      </p:sp>
+      <p:sp>
+        <p:nvSpPr>
+          <p:cNvPr id="4" name="Slide Number Placeholder 3"/>
+          <p:cNvSpPr>
+            <a:spLocks noGrp="1"/>
+          </p:cNvSpPr>
+          <p:nvPr>
+            <p:ph type="sldNum" idx="5" sz="quarter"/>
+          </p:nvPr>
+        </p:nvSpPr>
+        <p:spPr/>
+      </p:sp>
+    </p:spTree>
+  </p:cSld>
+  <p:clrMapOvr>
+    <a:masterClrMapping/>
+  </p:clrMapOvr>
+</p:notes>
+</file>
+
+<file path=ppt/notesSlides/notesSlide13.xml><?xml version="1.0" encoding="utf-8"?>
+<p:notes xmlns:a="http://schemas.openxmlformats.org/drawingml/2006/main" xmlns:p="http://schemas.openxmlformats.org/presentationml/2006/main" xmlns:r="http://schemas.openxmlformats.org/officeDocument/2006/relationships">
+  <p:cSld>
+    <p:spTree>
+      <p:nvGrpSpPr>
+        <p:cNvPr id="1" name=""/>
+        <p:cNvGrpSpPr/>
+        <p:nvPr/>
+      </p:nvGrpSpPr>
+      <p:grpSpPr>
+        <a:xfrm>
+          <a:off x="0" y="0"/>
+          <a:ext cx="0" cy="0"/>
+          <a:chOff x="0" y="0"/>
+          <a:chExt cx="0" cy="0"/>
+        </a:xfrm>
+      </p:grpSpPr>
+      <p:sp>
+        <p:nvSpPr>
+          <p:cNvPr id="2" name="Slide Image Placeholder 1"/>
+          <p:cNvSpPr>
+            <a:spLocks noGrp="1"/>
+          </p:cNvSpPr>
+          <p:nvPr>
+            <p:ph type="sldImg" idx="2"/>
+          </p:nvPr>
+        </p:nvSpPr>
+        <p:spPr/>
+      </p:sp>
+      <p:sp>
+        <p:nvSpPr>
+          <p:cNvPr id="3" name="Notes Placeholder 2"/>
+          <p:cNvSpPr>
+            <a:spLocks noGrp="1"/>
+          </p:cNvSpPr>
+          <p:nvPr>
+            <p:ph type="body" idx="3" sz="quarter"/>
+          </p:nvPr>
+        </p:nvSpPr>
+        <p:spPr/>
+        <p:txBody>
+          <a:bodyPr/>
+          <a:lstStyle/>
+          <a:p>
+            <a:r>
+              <a:t>Detokenization is the reverse of tokenization. The chosen number is converted back into an actual word that humans can read. That word is added to the response being generated. This process then repeats for the next word in the sequence. It continues until the response is complete, giving us the final text that you see as output.</a:t>
+            </a:r>
+          </a:p>
+        </p:txBody>
+      </p:sp>
+      <p:sp>
+        <p:nvSpPr>
+          <p:cNvPr id="4" name="Slide Number Placeholder 3"/>
+          <p:cNvSpPr>
+            <a:spLocks noGrp="1"/>
+          </p:cNvSpPr>
+          <p:nvPr>
+            <p:ph type="sldNum" idx="5" sz="quarter"/>
+          </p:nvPr>
+        </p:nvSpPr>
+        <p:spPr/>
+      </p:sp>
+    </p:spTree>
+  </p:cSld>
+  <p:clrMapOvr>
+    <a:masterClrMapping/>
+  </p:clrMapOvr>
+</p:notes>
+</file>
+
+<file path=ppt/notesSlides/notesSlide14.xml><?xml version="1.0" encoding="utf-8"?>
+<p:notes xmlns:a="http://schemas.openxmlformats.org/drawingml/2006/main" xmlns:p="http://schemas.openxmlformats.org/presentationml/2006/main" xmlns:r="http://schemas.openxmlformats.org/officeDocument/2006/relationships">
+  <p:cSld>
+    <p:spTree>
+      <p:nvGrpSpPr>
+        <p:cNvPr id="1" name=""/>
+        <p:cNvGrpSpPr/>
+        <p:nvPr/>
+      </p:nvGrpSpPr>
+      <p:grpSpPr>
+        <a:xfrm>
+          <a:off x="0" y="0"/>
+          <a:ext cx="0" cy="0"/>
+          <a:chOff x="0" y="0"/>
+          <a:chExt cx="0" cy="0"/>
+        </a:xfrm>
+      </p:grpSpPr>
+      <p:sp>
+        <p:nvSpPr>
+          <p:cNvPr id="2" name="Slide Image Placeholder 1"/>
+          <p:cNvSpPr>
+            <a:spLocks noGrp="1"/>
+          </p:cNvSpPr>
+          <p:nvPr>
+            <p:ph type="sldImg" idx="2"/>
+          </p:nvPr>
+        </p:nvSpPr>
+        <p:spPr/>
+      </p:sp>
+      <p:sp>
+        <p:nvSpPr>
+          <p:cNvPr id="3" name="Notes Placeholder 2"/>
+          <p:cNvSpPr>
+            <a:spLocks noGrp="1"/>
+          </p:cNvSpPr>
+          <p:nvPr>
+            <p:ph type="body" idx="3" sz="quarter"/>
+          </p:nvPr>
+        </p:nvSpPr>
+        <p:spPr/>
+        <p:txBody>
+          <a:bodyPr/>
+          <a:lstStyle/>
+          <a:p>
+            <a:r>
+              <a:t>The autoregressive loop describes how AI writes text one word at a time. First, the AI reads all the text generated so far. Second, it predicts the best next word using all the techniques we've discussed. Third, it adds that word to the growing text. Fourth, it repeats the process from step one, now including the newly added word. Finally, it stops when the response is deemed complete. It's like writing one word at a time while always reading everything that came before.</a:t>
+            </a:r>
+          </a:p>
+        </p:txBody>
+      </p:sp>
+      <p:sp>
+        <p:nvSpPr>
+          <p:cNvPr id="4" name="Slide Number Placeholder 3"/>
+          <p:cNvSpPr>
+            <a:spLocks noGrp="1"/>
+          </p:cNvSpPr>
+          <p:nvPr>
+            <p:ph type="sldNum" idx="5" sz="quarter"/>
+          </p:nvPr>
+        </p:nvSpPr>
+        <p:spPr/>
+      </p:sp>
+    </p:spTree>
+  </p:cSld>
+  <p:clrMapOvr>
+    <a:masterClrMapping/>
+  </p:clrMapOvr>
+</p:notes>
+</file>
+
+<file path=ppt/notesSlides/notesSlide15.xml><?xml version="1.0" encoding="utf-8"?>
+<p:notes xmlns:a="http://schemas.openxmlformats.org/drawingml/2006/main" xmlns:p="http://schemas.openxmlformats.org/presentationml/2006/main" xmlns:r="http://schemas.openxmlformats.org/officeDocument/2006/relationships">
+  <p:cSld>
+    <p:spTree>
+      <p:nvGrpSpPr>
+        <p:cNvPr id="1" name=""/>
+        <p:cNvGrpSpPr/>
+        <p:nvPr/>
+      </p:nvGrpSpPr>
+      <p:grpSpPr>
+        <a:xfrm>
+          <a:off x="0" y="0"/>
+          <a:ext cx="0" cy="0"/>
+          <a:chOff x="0" y="0"/>
+          <a:chExt cx="0" cy="0"/>
+        </a:xfrm>
+      </p:grpSpPr>
+      <p:sp>
+        <p:nvSpPr>
+          <p:cNvPr id="2" name="Slide Image Placeholder 1"/>
+          <p:cNvSpPr>
+            <a:spLocks noGrp="1"/>
+          </p:cNvSpPr>
+          <p:nvPr>
+            <p:ph type="sldImg" idx="2"/>
+          </p:nvPr>
+        </p:nvSpPr>
+        <p:spPr/>
+      </p:sp>
+      <p:sp>
+        <p:nvSpPr>
+          <p:cNvPr id="3" name="Notes Placeholder 2"/>
+          <p:cNvSpPr>
+            <a:spLocks noGrp="1"/>
+          </p:cNvSpPr>
+          <p:nvPr>
+            <p:ph type="body" idx="3" sz="quarter"/>
+          </p:nvPr>
+        </p:nvSpPr>
+        <p:spPr/>
+        <p:txBody>
+          <a:bodyPr/>
+          <a:lstStyle/>
+          <a:p>
+            <a:r>
+              <a:t>Let's review how everything works together. Your input text is broken into pieces through tokenization. Understanding is created through embeddings. Connections are found through attention mechanisms. The next word is predicted using all these layers of processing. Finally, text appears through detokenization. The key ideas to remember are: AI processes text in many layers, each layer adds deeper understanding, the AI predicts one word at a time, and it always considers everything that came before when making predictions. Thank you for your attention.</a:t>
+            </a:r>
+          </a:p>
+        </p:txBody>
+      </p:sp>
+      <p:sp>
+        <p:nvSpPr>
+          <p:cNvPr id="4" name="Slide Number Placeholder 3"/>
+          <p:cNvSpPr>
+            <a:spLocks noGrp="1"/>
+          </p:cNvSpPr>
+          <p:nvPr>
+            <p:ph type="sldNum" idx="5" sz="quarter"/>
+          </p:nvPr>
+        </p:nvSpPr>
+        <p:spPr/>
+      </p:sp>
+    </p:spTree>
+  </p:cSld>
+  <p:clrMapOvr>
+    <a:masterClrMapping/>
+  </p:clrMapOvr>
+</p:notes>
+</file>
+
+<file path=ppt/notesSlides/notesSlide2.xml><?xml version="1.0" encoding="utf-8"?>
+<p:notes xmlns:a="http://schemas.openxmlformats.org/drawingml/2006/main" xmlns:p="http://schemas.openxmlformats.org/presentationml/2006/main" xmlns:r="http://schemas.openxmlformats.org/officeDocument/2006/relationships">
+  <p:cSld>
+    <p:spTree>
+      <p:nvGrpSpPr>
+        <p:cNvPr id="1" name=""/>
+        <p:cNvGrpSpPr/>
+        <p:nvPr/>
+      </p:nvGrpSpPr>
+      <p:grpSpPr>
+        <a:xfrm>
+          <a:off x="0" y="0"/>
+          <a:ext cx="0" cy="0"/>
+          <a:chOff x="0" y="0"/>
+          <a:chExt cx="0" cy="0"/>
+        </a:xfrm>
+      </p:grpSpPr>
+      <p:sp>
+        <p:nvSpPr>
+          <p:cNvPr id="2" name="Slide Image Placeholder 1"/>
+          <p:cNvSpPr>
+            <a:spLocks noGrp="1"/>
+          </p:cNvSpPr>
+          <p:nvPr>
+            <p:ph type="sldImg" idx="2"/>
+          </p:nvPr>
+        </p:nvSpPr>
+        <p:spPr/>
+      </p:sp>
+      <p:sp>
+        <p:nvSpPr>
+          <p:cNvPr id="3" name="Notes Placeholder 2"/>
+          <p:cNvSpPr>
+            <a:spLocks noGrp="1"/>
+          </p:cNvSpPr>
+          <p:nvPr>
+            <p:ph type="body" idx="3" sz="quarter"/>
+          </p:nvPr>
+        </p:nvSpPr>
+        <p:spPr/>
+        <p:txBody>
+          <a:bodyPr/>
+          <a:lstStyle/>
+          <a:p>
+            <a:r>
+              <a:t>Tokenization is the first step in how AI processes text. Unlike humans who naturally understand words, AI systems need to break text down into smaller chunks called tokens. Each of these chunks is assigned a unique number, similar to how products in a store get barcodes. For example, the phrase "The cat" might be converted into a sequence of numbers like 415 and 2891. This numerical representation allows the AI to process language mathematically.</a:t>
+            </a:r>
+          </a:p>
+        </p:txBody>
+      </p:sp>
+      <p:sp>
+        <p:nvSpPr>
+          <p:cNvPr id="4" name="Slide Number Placeholder 3"/>
+          <p:cNvSpPr>
+            <a:spLocks noGrp="1"/>
+          </p:cNvSpPr>
+          <p:nvPr>
+            <p:ph type="sldNum" idx="5" sz="quarter"/>
+          </p:nvPr>
+        </p:nvSpPr>
+        <p:spPr/>
+      </p:sp>
+    </p:spTree>
+  </p:cSld>
+  <p:clrMapOvr>
+    <a:masterClrMapping/>
+  </p:clrMapOvr>
+</p:notes>
+</file>
+
+<file path=ppt/notesSlides/notesSlide3.xml><?xml version="1.0" encoding="utf-8"?>
+<p:notes xmlns:a="http://schemas.openxmlformats.org/drawingml/2006/main" xmlns:p="http://schemas.openxmlformats.org/presentationml/2006/main" xmlns:r="http://schemas.openxmlformats.org/officeDocument/2006/relationships">
+  <p:cSld>
+    <p:spTree>
+      <p:nvGrpSpPr>
+        <p:cNvPr id="1" name=""/>
+        <p:cNvGrpSpPr/>
+        <p:nvPr/>
+      </p:nvGrpSpPr>
+      <p:grpSpPr>
+        <a:xfrm>
+          <a:off x="0" y="0"/>
+          <a:ext cx="0" cy="0"/>
+          <a:chOff x="0" y="0"/>
+          <a:chExt cx="0" cy="0"/>
+        </a:xfrm>
+      </p:grpSpPr>
+      <p:sp>
+        <p:nvSpPr>
+          <p:cNvPr id="2" name="Slide Image Placeholder 1"/>
+          <p:cNvSpPr>
+            <a:spLocks noGrp="1"/>
+          </p:cNvSpPr>
+          <p:nvPr>
+            <p:ph type="sldImg" idx="2"/>
+          </p:nvPr>
+        </p:nvSpPr>
+        <p:spPr/>
+      </p:sp>
+      <p:sp>
+        <p:nvSpPr>
+          <p:cNvPr id="3" name="Notes Placeholder 2"/>
+          <p:cNvSpPr>
+            <a:spLocks noGrp="1"/>
+          </p:cNvSpPr>
+          <p:nvPr>
+            <p:ph type="body" idx="3" sz="quarter"/>
+          </p:nvPr>
+        </p:nvSpPr>
+        <p:spPr/>
+        <p:txBody>
+          <a:bodyPr/>
+          <a:lstStyle/>
+          <a:p>
+            <a:r>
+              <a:t>Once text is tokenized into numbers, those numbers are transformed into what we call embeddings. Each token number becomes a point in a high-dimensional space, where similar words are positioned close to each other. Think of it like organizing books by topic in a library, where related books are shelved near one another. The AI learns these spatial relationships during its training process, which helps it understand how different words and concepts relate to each other.</a:t>
+            </a:r>
+          </a:p>
+        </p:txBody>
+      </p:sp>
+      <p:sp>
+        <p:nvSpPr>
+          <p:cNvPr id="4" name="Slide Number Placeholder 3"/>
+          <p:cNvSpPr>
+            <a:spLocks noGrp="1"/>
+          </p:cNvSpPr>
+          <p:nvPr>
+            <p:ph type="sldNum" idx="5" sz="quarter"/>
+          </p:nvPr>
+        </p:nvSpPr>
+        <p:spPr/>
+      </p:sp>
+    </p:spTree>
+  </p:cSld>
+  <p:clrMapOvr>
+    <a:masterClrMapping/>
+  </p:clrMapOvr>
+</p:notes>
+</file>
+
+<file path=ppt/notesSlides/notesSlide4.xml><?xml version="1.0" encoding="utf-8"?>
+<p:notes xmlns:a="http://schemas.openxmlformats.org/drawingml/2006/main" xmlns:p="http://schemas.openxmlformats.org/presentationml/2006/main" xmlns:r="http://schemas.openxmlformats.org/officeDocument/2006/relationships">
+  <p:cSld>
+    <p:spTree>
+      <p:nvGrpSpPr>
+        <p:cNvPr id="1" name=""/>
+        <p:cNvGrpSpPr/>
+        <p:nvPr/>
+      </p:nvGrpSpPr>
+      <p:grpSpPr>
+        <a:xfrm>
+          <a:off x="0" y="0"/>
+          <a:ext cx="0" cy="0"/>
+          <a:chOff x="0" y="0"/>
+          <a:chExt cx="0" cy="0"/>
+        </a:xfrm>
+      </p:grpSpPr>
+      <p:sp>
+        <p:nvSpPr>
+          <p:cNvPr id="2" name="Slide Image Placeholder 1"/>
+          <p:cNvSpPr>
+            <a:spLocks noGrp="1"/>
+          </p:cNvSpPr>
+          <p:nvPr>
+            <p:ph type="sldImg" idx="2"/>
+          </p:nvPr>
+        </p:nvSpPr>
+        <p:spPr/>
+      </p:sp>
+      <p:sp>
+        <p:nvSpPr>
+          <p:cNvPr id="3" name="Notes Placeholder 2"/>
+          <p:cNvSpPr>
+            <a:spLocks noGrp="1"/>
+          </p:cNvSpPr>
+          <p:nvPr>
+            <p:ph type="body" idx="3" sz="quarter"/>
+          </p:nvPr>
+        </p:nvSpPr>
+        <p:spPr/>
+        <p:txBody>
+          <a:bodyPr/>
+          <a:lstStyle/>
+          <a:p>
+            <a:r>
+              <a:t>The concept of embedding vectors is central to how AI works. The entire process revolves around refining these vectors so they encode various relationships between tokens. All the complex mathematics involves linear algebra and matrix operations. Ultimately, these carefully crafted vectors are what enable the AI to predict the next word in a sequence.</a:t>
+            </a:r>
+          </a:p>
+        </p:txBody>
+      </p:sp>
+      <p:sp>
+        <p:nvSpPr>
+          <p:cNvPr id="4" name="Slide Number Placeholder 3"/>
+          <p:cNvSpPr>
+            <a:spLocks noGrp="1"/>
+          </p:cNvSpPr>
+          <p:nvPr>
+            <p:ph type="sldNum" idx="5" sz="quarter"/>
+          </p:nvPr>
+        </p:nvSpPr>
+        <p:spPr/>
+      </p:sp>
+    </p:spTree>
+  </p:cSld>
+  <p:clrMapOvr>
+    <a:masterClrMapping/>
+  </p:clrMapOvr>
+</p:notes>
+</file>
+
+<file path=ppt/notesSlides/notesSlide5.xml><?xml version="1.0" encoding="utf-8"?>
+<p:notes xmlns:a="http://schemas.openxmlformats.org/drawingml/2006/main" xmlns:p="http://schemas.openxmlformats.org/presentationml/2006/main" xmlns:r="http://schemas.openxmlformats.org/officeDocument/2006/relationships">
+  <p:cSld>
+    <p:spTree>
+      <p:nvGrpSpPr>
+        <p:cNvPr id="1" name=""/>
+        <p:cNvGrpSpPr/>
+        <p:nvPr/>
+      </p:nvGrpSpPr>
+      <p:grpSpPr>
+        <a:xfrm>
+          <a:off x="0" y="0"/>
+          <a:ext cx="0" cy="0"/>
+          <a:chOff x="0" y="0"/>
+          <a:chExt cx="0" cy="0"/>
+        </a:xfrm>
+      </p:grpSpPr>
+      <p:sp>
+        <p:nvSpPr>
+          <p:cNvPr id="2" name="Slide Image Placeholder 1"/>
+          <p:cNvSpPr>
+            <a:spLocks noGrp="1"/>
+          </p:cNvSpPr>
+          <p:nvPr>
+            <p:ph type="sldImg" idx="2"/>
+          </p:nvPr>
+        </p:nvSpPr>
+        <p:spPr/>
+      </p:sp>
+      <p:sp>
+        <p:nvSpPr>
+          <p:cNvPr id="3" name="Notes Placeholder 2"/>
+          <p:cNvSpPr>
+            <a:spLocks noGrp="1"/>
+          </p:cNvSpPr>
+          <p:nvPr>
+            <p:ph type="body" idx="3" sz="quarter"/>
+          </p:nvPr>
+        </p:nvSpPr>
+        <p:spPr/>
+        <p:txBody>
+          <a:bodyPr/>
+          <a:lstStyle/>
+          <a:p>
+            <a:r>
+              <a:t>Word order is crucial for meaning. Consider the difference between "Dog bites man" and "Man bites dog" - these sentences tell very different stories using the same words. The AI needs to track which word came first, second, and third in the sequence. This is accomplished through positional encoding, where special markers are added to remember the position of each word, much like numbering pages in a book. This encoding helps the AI maintain the proper meaning of sentences.</a:t>
+            </a:r>
+          </a:p>
+        </p:txBody>
+      </p:sp>
+      <p:sp>
+        <p:nvSpPr>
+          <p:cNvPr id="4" name="Slide Number Placeholder 3"/>
+          <p:cNvSpPr>
+            <a:spLocks noGrp="1"/>
+          </p:cNvSpPr>
+          <p:nvPr>
+            <p:ph type="sldNum" idx="5" sz="quarter"/>
+          </p:nvPr>
+        </p:nvSpPr>
+        <p:spPr/>
+      </p:sp>
+    </p:spTree>
+  </p:cSld>
+  <p:clrMapOvr>
+    <a:masterClrMapping/>
+  </p:clrMapOvr>
+</p:notes>
+</file>
+
+<file path=ppt/notesSlides/notesSlide6.xml><?xml version="1.0" encoding="utf-8"?>
+<p:notes xmlns:a="http://schemas.openxmlformats.org/drawingml/2006/main" xmlns:p="http://schemas.openxmlformats.org/presentationml/2006/main" xmlns:r="http://schemas.openxmlformats.org/officeDocument/2006/relationships">
+  <p:cSld>
+    <p:spTree>
+      <p:nvGrpSpPr>
+        <p:cNvPr id="1" name=""/>
+        <p:cNvGrpSpPr/>
+        <p:nvPr/>
+      </p:nvGrpSpPr>
+      <p:grpSpPr>
+        <a:xfrm>
+          <a:off x="0" y="0"/>
+          <a:ext cx="0" cy="0"/>
+          <a:chOff x="0" y="0"/>
+          <a:chExt cx="0" cy="0"/>
+        </a:xfrm>
+      </p:grpSpPr>
+      <p:sp>
+        <p:nvSpPr>
+          <p:cNvPr id="2" name="Slide Image Placeholder 1"/>
+          <p:cNvSpPr>
+            <a:spLocks noGrp="1"/>
+          </p:cNvSpPr>
+          <p:nvPr>
+            <p:ph type="sldImg" idx="2"/>
+          </p:nvPr>
+        </p:nvSpPr>
+        <p:spPr/>
+      </p:sp>
+      <p:sp>
+        <p:nvSpPr>
+          <p:cNvPr id="3" name="Notes Placeholder 2"/>
+          <p:cNvSpPr>
+            <a:spLocks noGrp="1"/>
+          </p:cNvSpPr>
+          <p:nvPr>
+            <p:ph type="body" idx="3" sz="quarter"/>
+          </p:nvPr>
+        </p:nvSpPr>
+        <p:spPr/>
+        <p:txBody>
+          <a:bodyPr/>
+          <a:lstStyle/>
+          <a:p>
+            <a:r>
+              <a:t>Transformer blocks are the core thinking components of modern AI. The AI is built with many layers stacked on top of each other, like floors in a building. Each successive layer develops a deeper understanding of the text. The bottom layers handle basic patterns like grammar and word associations, while the top layers tackle complex ideas and reasoning. Generally, more layers result in a more capable AI. Each transformer block consists of three main components: attention mechanisms, neural networks, and normalization.</a:t>
+            </a:r>
+          </a:p>
+        </p:txBody>
+      </p:sp>
+      <p:sp>
+        <p:nvSpPr>
+          <p:cNvPr id="4" name="Slide Number Placeholder 3"/>
+          <p:cNvSpPr>
+            <a:spLocks noGrp="1"/>
+          </p:cNvSpPr>
+          <p:nvPr>
+            <p:ph type="sldNum" idx="5" sz="quarter"/>
+          </p:nvPr>
+        </p:nvSpPr>
+        <p:spPr/>
+      </p:sp>
+    </p:spTree>
+  </p:cSld>
+  <p:clrMapOvr>
+    <a:masterClrMapping/>
+  </p:clrMapOvr>
+</p:notes>
+</file>
+
+<file path=ppt/notesSlides/notesSlide7.xml><?xml version="1.0" encoding="utf-8"?>
+<p:notes xmlns:a="http://schemas.openxmlformats.org/drawingml/2006/main" xmlns:p="http://schemas.openxmlformats.org/presentationml/2006/main" xmlns:r="http://schemas.openxmlformats.org/officeDocument/2006/relationships">
+  <p:cSld>
+    <p:spTree>
+      <p:nvGrpSpPr>
+        <p:cNvPr id="1" name=""/>
+        <p:cNvGrpSpPr/>
+        <p:nvPr/>
+      </p:nvGrpSpPr>
+      <p:grpSpPr>
+        <a:xfrm>
+          <a:off x="0" y="0"/>
+          <a:ext cx="0" cy="0"/>
+          <a:chOff x="0" y="0"/>
+          <a:chExt cx="0" cy="0"/>
+        </a:xfrm>
+      </p:grpSpPr>
+      <p:sp>
+        <p:nvSpPr>
+          <p:cNvPr id="2" name="Slide Image Placeholder 1"/>
+          <p:cNvSpPr>
+            <a:spLocks noGrp="1"/>
+          </p:cNvSpPr>
+          <p:nvPr>
+            <p:ph type="sldImg" idx="2"/>
+          </p:nvPr>
+        </p:nvSpPr>
+        <p:spPr/>
+      </p:sp>
+      <p:sp>
+        <p:nvSpPr>
+          <p:cNvPr id="3" name="Notes Placeholder 2"/>
+          <p:cNvSpPr>
+            <a:spLocks noGrp="1"/>
+          </p:cNvSpPr>
+          <p:nvPr>
+            <p:ph type="body" idx="3" sz="quarter"/>
+          </p:nvPr>
+        </p:nvSpPr>
+        <p:spPr/>
+        <p:txBody>
+          <a:bodyPr/>
+          <a:lstStyle/>
+          <a:p>
+            <a:r>
+              <a:t>The attention mechanism is how the AI understands connections between words. In this process, each word examines every other word in the sentence. The AI essentially asks itself, "How does this word relate to that word?" Multiple attention heads work in parallel, each focusing on different types of relationships. For example, in the sentence "The dog was tired," the attention mechanism connects the word "tired" back to "dog." This is the fundamental way AI understands context.</a:t>
+            </a:r>
+          </a:p>
+        </p:txBody>
+      </p:sp>
+      <p:sp>
+        <p:nvSpPr>
+          <p:cNvPr id="4" name="Slide Number Placeholder 3"/>
+          <p:cNvSpPr>
+            <a:spLocks noGrp="1"/>
+          </p:cNvSpPr>
+          <p:nvPr>
+            <p:ph type="sldNum" idx="5" sz="quarter"/>
+          </p:nvPr>
+        </p:nvSpPr>
+        <p:spPr/>
+      </p:sp>
+    </p:spTree>
+  </p:cSld>
+  <p:clrMapOvr>
+    <a:masterClrMapping/>
+  </p:clrMapOvr>
+</p:notes>
+</file>
+
+<file path=ppt/notesSlides/notesSlide8.xml><?xml version="1.0" encoding="utf-8"?>
+<p:notes xmlns:a="http://schemas.openxmlformats.org/drawingml/2006/main" xmlns:p="http://schemas.openxmlformats.org/presentationml/2006/main" xmlns:r="http://schemas.openxmlformats.org/officeDocument/2006/relationships">
+  <p:cSld>
+    <p:spTree>
+      <p:nvGrpSpPr>
+        <p:cNvPr id="1" name=""/>
+        <p:cNvGrpSpPr/>
+        <p:nvPr/>
+      </p:nvGrpSpPr>
+      <p:grpSpPr>
+        <a:xfrm>
+          <a:off x="0" y="0"/>
+          <a:ext cx="0" cy="0"/>
+          <a:chOff x="0" y="0"/>
+          <a:chExt cx="0" cy="0"/>
+        </a:xfrm>
+      </p:grpSpPr>
+      <p:sp>
+        <p:nvSpPr>
+          <p:cNvPr id="2" name="Slide Image Placeholder 1"/>
+          <p:cNvSpPr>
+            <a:spLocks noGrp="1"/>
+          </p:cNvSpPr>
+          <p:nvPr>
+            <p:ph type="sldImg" idx="2"/>
+          </p:nvPr>
+        </p:nvSpPr>
+        <p:spPr/>
+      </p:sp>
+      <p:sp>
+        <p:nvSpPr>
+          <p:cNvPr id="3" name="Notes Placeholder 2"/>
+          <p:cNvSpPr>
+            <a:spLocks noGrp="1"/>
+          </p:cNvSpPr>
+          <p:nvPr>
+            <p:ph type="body" idx="3" sz="quarter"/>
+          </p:nvPr>
+        </p:nvSpPr>
+        <p:spPr/>
+        <p:txBody>
+          <a:bodyPr/>
+          <a:lstStyle/>
+          <a:p>
+            <a:r>
+              <a:t>After the attention mechanism identifies connections between words, each word is processed individually through a feed-forward neural network. You can think of this like a filter that enhances certain features of the understanding. This processing makes the comprehension richer and more detailed. It happens at every layer of the model and works in combination with the context understanding from attention to create full meaning.</a:t>
+            </a:r>
+          </a:p>
+        </p:txBody>
+      </p:sp>
+      <p:sp>
+        <p:nvSpPr>
+          <p:cNvPr id="4" name="Slide Number Placeholder 3"/>
+          <p:cNvSpPr>
+            <a:spLocks noGrp="1"/>
+          </p:cNvSpPr>
+          <p:nvPr>
+            <p:ph type="sldNum" idx="5" sz="quarter"/>
+          </p:nvPr>
+        </p:nvSpPr>
+        <p:spPr/>
+      </p:sp>
+    </p:spTree>
+  </p:cSld>
+  <p:clrMapOvr>
+    <a:masterClrMapping/>
+  </p:clrMapOvr>
+</p:notes>
+</file>
+
+<file path=ppt/notesSlides/notesSlide9.xml><?xml version="1.0" encoding="utf-8"?>
+<p:notes xmlns:a="http://schemas.openxmlformats.org/drawingml/2006/main" xmlns:p="http://schemas.openxmlformats.org/presentationml/2006/main" xmlns:r="http://schemas.openxmlformats.org/officeDocument/2006/relationships">
+  <p:cSld>
+    <p:spTree>
+      <p:nvGrpSpPr>
+        <p:cNvPr id="1" name=""/>
+        <p:cNvGrpSpPr/>
+        <p:nvPr/>
+      </p:nvGrpSpPr>
+      <p:grpSpPr>
+        <a:xfrm>
+          <a:off x="0" y="0"/>
+          <a:ext cx="0" cy="0"/>
+          <a:chOff x="0" y="0"/>
+          <a:chExt cx="0" cy="0"/>
+        </a:xfrm>
+      </p:grpSpPr>
+      <p:sp>
+        <p:nvSpPr>
+          <p:cNvPr id="2" name="Slide Image Placeholder 1"/>
+          <p:cNvSpPr>
+            <a:spLocks noGrp="1"/>
+          </p:cNvSpPr>
+          <p:nvPr>
+            <p:ph type="sldImg" idx="2"/>
+          </p:nvPr>
+        </p:nvSpPr>
+        <p:spPr/>
+      </p:sp>
+      <p:sp>
+        <p:nvSpPr>
+          <p:cNvPr id="3" name="Notes Placeholder 2"/>
+          <p:cNvSpPr>
+            <a:spLocks noGrp="1"/>
+          </p:cNvSpPr>
+          <p:nvPr>
+            <p:ph type="body" idx="3" sz="quarter"/>
+          </p:nvPr>
+        </p:nvSpPr>
+        <p:spPr/>
+        <p:txBody>
+          <a:bodyPr/>
+          <a:lstStyle/>
+          <a:p>
+            <a:r>
+              <a:t>With so many layers of processing, things could easily become unstable or chaotic. Normalization techniques keep the data organized and consistent as it flows through the network. Think of it as a quality control check at each step of the process. This ensures the AI doesn't get confused or produce nonsensical outputs, and it allows for very deep and complex models that remain stable.</a:t>
+            </a:r>
+          </a:p>
+        </p:txBody>
+      </p:sp>
+      <p:sp>
+        <p:nvSpPr>
+          <p:cNvPr id="4" name="Slide Number Placeholder 3"/>
+          <p:cNvSpPr>
+            <a:spLocks noGrp="1"/>
+          </p:cNvSpPr>
+          <p:nvPr>
+            <p:ph type="sldNum" idx="5" sz="quarter"/>
+          </p:nvPr>
+        </p:nvSpPr>
+        <p:spPr/>
+      </p:sp>
+    </p:spTree>
+  </p:cSld>
+  <p:clrMapOvr>
+    <a:masterClrMapping/>
+  </p:clrMapOvr>
+</p:notes>
 </file>
 
 <file path=ppt/slideLayouts/slideLayout1.xml><?xml version="1.0" encoding="utf-8"?>
@@ -3186,7 +4587,7 @@
               <a:defRPr sz="3200" b="1"/>
             </a:pPr>
             <a:r>
-              <a:t>Softmax: Calculating Probabilities</a:t>
+              <a:t>Projection: Preparing Predictions</a:t>
             </a:r>
           </a:p>
         </p:txBody>
@@ -3210,47 +4611,47 @@
               <a:defRPr sz="2000" b="1"/>
             </a:pPr>
             <a:r>
-              <a:t>From scores to chances</a:t>
-            </a:r>
-          </a:p>
-          <a:p>
-            <a:pPr>
-              <a:defRPr sz="1800"/>
-            </a:pPr>
-            <a:r>
-              <a:t>Scores get converted to percentages</a:t>
-            </a:r>
-          </a:p>
-          <a:p>
-            <a:pPr>
-              <a:defRPr sz="1800"/>
-            </a:pPr>
-            <a:r>
-              <a:t>All percentages add up to 100%</a:t>
-            </a:r>
-          </a:p>
-          <a:p>
-            <a:pPr>
-              <a:defRPr sz="1800"/>
-            </a:pPr>
-            <a:r>
-              <a:t>Shows how confident the AI is about each word</a:t>
-            </a:r>
-          </a:p>
-          <a:p>
-            <a:pPr>
-              <a:defRPr sz="1800"/>
-            </a:pPr>
-            <a:r>
-              <a:t>Can be adjusted to be more creative or more predictable</a:t>
-            </a:r>
-          </a:p>
-          <a:p>
-            <a:pPr>
-              <a:defRPr sz="1800"/>
-            </a:pPr>
-            <a:r>
-              <a:t>More randomness = more creative, less predictable</a:t>
+              <a:t>Getting ready to respond</a:t>
+            </a:r>
+          </a:p>
+          <a:p>
+            <a:pPr>
+              <a:defRPr sz="1800"/>
+            </a:pPr>
+            <a:r>
+              <a:t>The final understanding gets converted to possible next words</a:t>
+            </a:r>
+          </a:p>
+          <a:p>
+            <a:pPr>
+              <a:defRPr sz="1800"/>
+            </a:pPr>
+            <a:r>
+              <a:t>Every word in the vocabulary gets a score</a:t>
+            </a:r>
+          </a:p>
+          <a:p>
+            <a:pPr>
+              <a:defRPr sz="1800"/>
+            </a:pPr>
+            <a:r>
+              <a:t>Higher score = more likely to be the next word</a:t>
+            </a:r>
+          </a:p>
+          <a:p>
+            <a:pPr>
+              <a:defRPr sz="1800"/>
+            </a:pPr>
+            <a:r>
+              <a:t>Like having thousands of options ranked by confidence</a:t>
+            </a:r>
+          </a:p>
+          <a:p>
+            <a:pPr>
+              <a:defRPr sz="1800"/>
+            </a:pPr>
+            <a:r>
+              <a:t>This creates a list of possibilities</a:t>
             </a:r>
           </a:p>
         </p:txBody>
@@ -3292,7 +4693,7 @@
               <a:defRPr sz="3200" b="1"/>
             </a:pPr>
             <a:r>
-              <a:t>Choosing the Next Word</a:t>
+              <a:t>Softmax: Calculating Probabilities</a:t>
             </a:r>
           </a:p>
         </p:txBody>
@@ -3316,71 +4717,47 @@
               <a:defRPr sz="2000" b="1"/>
             </a:pPr>
             <a:r>
-              <a:t>Making the decision</a:t>
-            </a:r>
-          </a:p>
-          <a:p>
-            <a:pPr>
-              <a:defRPr sz="2000" b="1"/>
-            </a:pPr>
-            <a:r>
-              <a:t>Different approaches:</a:t>
-            </a:r>
-          </a:p>
-          <a:p>
-            <a:pPr>
-              <a:defRPr sz="1800"/>
-            </a:pPr>
-            <a:r>
-              <a:t>Argmax: Pick the most likely word (safe and predictable)</a:t>
-            </a:r>
-          </a:p>
-          <a:p>
-            <a:pPr>
-              <a:defRPr sz="1800"/>
-            </a:pPr>
-            <a:r>
-              <a:t>Sample: Choose randomly from top candidates (more creative)</a:t>
-            </a:r>
-          </a:p>
-          <a:p>
-            <a:pPr>
-              <a:defRPr sz="1800"/>
-            </a:pPr>
-            <a:r>
-              <a:t>Balance between creativity and accuracy</a:t>
-            </a:r>
-          </a:p>
-          <a:p>
-            <a:pPr>
-              <a:defRPr sz="2000" b="1"/>
-            </a:pPr>
-            <a:r>
-              <a:t>Why it matters:</a:t>
-            </a:r>
-          </a:p>
-          <a:p>
-            <a:pPr>
-              <a:defRPr sz="1800"/>
-            </a:pPr>
-            <a:r>
-              <a:t>Predictable: consistent but can be boring</a:t>
-            </a:r>
-          </a:p>
-          <a:p>
-            <a:pPr>
-              <a:defRPr sz="1800"/>
-            </a:pPr>
-            <a:r>
-              <a:t>Random: interesting but sometimes makes mistakes</a:t>
-            </a:r>
-          </a:p>
-          <a:p>
-            <a:pPr>
-              <a:defRPr sz="1800"/>
-            </a:pPr>
-            <a:r>
-              <a:t>Most systems use a mix</a:t>
+              <a:t>From scores to chances</a:t>
+            </a:r>
+          </a:p>
+          <a:p>
+            <a:pPr>
+              <a:defRPr sz="1800"/>
+            </a:pPr>
+            <a:r>
+              <a:t>Scores get converted to percentages</a:t>
+            </a:r>
+          </a:p>
+          <a:p>
+            <a:pPr>
+              <a:defRPr sz="1800"/>
+            </a:pPr>
+            <a:r>
+              <a:t>All percentages add up to 100%</a:t>
+            </a:r>
+          </a:p>
+          <a:p>
+            <a:pPr>
+              <a:defRPr sz="1800"/>
+            </a:pPr>
+            <a:r>
+              <a:t>Shows how confident the AI is about each word</a:t>
+            </a:r>
+          </a:p>
+          <a:p>
+            <a:pPr>
+              <a:defRPr sz="1800"/>
+            </a:pPr>
+            <a:r>
+              <a:t>Can be adjusted to be more creative or more predictable</a:t>
+            </a:r>
+          </a:p>
+          <a:p>
+            <a:pPr>
+              <a:defRPr sz="1800"/>
+            </a:pPr>
+            <a:r>
+              <a:t>More randomness = more creative, less predictable</a:t>
             </a:r>
           </a:p>
         </p:txBody>
@@ -3422,7 +4799,7 @@
               <a:defRPr sz="3200" b="1"/>
             </a:pPr>
             <a:r>
-              <a:t>Detokenization: Converting Back to Text</a:t>
+              <a:t>Choosing the Next Word</a:t>
             </a:r>
           </a:p>
         </p:txBody>
@@ -3446,47 +4823,71 @@
               <a:defRPr sz="2000" b="1"/>
             </a:pPr>
             <a:r>
-              <a:t>From numbers to words</a:t>
-            </a:r>
-          </a:p>
-          <a:p>
-            <a:pPr>
-              <a:defRPr sz="1800"/>
-            </a:pPr>
-            <a:r>
-              <a:t>The chosen number becomes a word again</a:t>
-            </a:r>
-          </a:p>
-          <a:p>
-            <a:pPr>
-              <a:defRPr sz="1800"/>
-            </a:pPr>
-            <a:r>
-              <a:t>That word gets added to the response</a:t>
-            </a:r>
-          </a:p>
-          <a:p>
-            <a:pPr>
-              <a:defRPr sz="1800"/>
-            </a:pPr>
-            <a:r>
-              <a:t>The process repeats for the next word</a:t>
-            </a:r>
-          </a:p>
-          <a:p>
-            <a:pPr>
-              <a:defRPr sz="1800"/>
-            </a:pPr>
-            <a:r>
-              <a:t>Continues until the response is complete</a:t>
-            </a:r>
-          </a:p>
-          <a:p>
-            <a:pPr>
-              <a:defRPr sz="1800"/>
-            </a:pPr>
-            <a:r>
-              <a:t>Final result: the text you see</a:t>
+              <a:t>Making the decision</a:t>
+            </a:r>
+          </a:p>
+          <a:p>
+            <a:pPr>
+              <a:defRPr sz="2000" b="1"/>
+            </a:pPr>
+            <a:r>
+              <a:t>Different approaches:</a:t>
+            </a:r>
+          </a:p>
+          <a:p>
+            <a:pPr>
+              <a:defRPr sz="1800"/>
+            </a:pPr>
+            <a:r>
+              <a:t>Argmax: Pick the most likely word (safe and predictable)</a:t>
+            </a:r>
+          </a:p>
+          <a:p>
+            <a:pPr>
+              <a:defRPr sz="1800"/>
+            </a:pPr>
+            <a:r>
+              <a:t>Sample: Choose randomly from top candidates (more creative)</a:t>
+            </a:r>
+          </a:p>
+          <a:p>
+            <a:pPr>
+              <a:defRPr sz="1800"/>
+            </a:pPr>
+            <a:r>
+              <a:t>Balance between creativity and accuracy</a:t>
+            </a:r>
+          </a:p>
+          <a:p>
+            <a:pPr>
+              <a:defRPr sz="2000" b="1"/>
+            </a:pPr>
+            <a:r>
+              <a:t>Why it matters:</a:t>
+            </a:r>
+          </a:p>
+          <a:p>
+            <a:pPr>
+              <a:defRPr sz="1800"/>
+            </a:pPr>
+            <a:r>
+              <a:t>Predictable: consistent but can be boring</a:t>
+            </a:r>
+          </a:p>
+          <a:p>
+            <a:pPr>
+              <a:defRPr sz="1800"/>
+            </a:pPr>
+            <a:r>
+              <a:t>Random: interesting but sometimes makes mistakes</a:t>
+            </a:r>
+          </a:p>
+          <a:p>
+            <a:pPr>
+              <a:defRPr sz="1800"/>
+            </a:pPr>
+            <a:r>
+              <a:t>Most systems use a mix</a:t>
             </a:r>
           </a:p>
         </p:txBody>
@@ -3528,7 +4929,7 @@
               <a:defRPr sz="3200" b="1"/>
             </a:pPr>
             <a:r>
-              <a:t>The Autoregressive Loop</a:t>
+              <a:t>Detokenization: Converting Back to Text</a:t>
             </a:r>
           </a:p>
         </p:txBody>
@@ -3552,55 +4953,47 @@
               <a:defRPr sz="2000" b="1"/>
             </a:pPr>
             <a:r>
-              <a:t>How AI writes one word at a time</a:t>
-            </a:r>
-          </a:p>
-          <a:p>
-            <a:pPr>
-              <a:defRPr sz="1800"/>
-            </a:pPr>
-            <a:r>
-              <a:t>Read all the text so far</a:t>
-            </a:r>
-          </a:p>
-          <a:p>
-            <a:pPr>
-              <a:defRPr sz="1800"/>
-            </a:pPr>
-            <a:r>
-              <a:t>Predict the best next word</a:t>
-            </a:r>
-          </a:p>
-          <a:p>
-            <a:pPr>
-              <a:defRPr sz="1800"/>
-            </a:pPr>
-            <a:r>
-              <a:t>Add that word to the text</a:t>
-            </a:r>
-          </a:p>
-          <a:p>
-            <a:pPr>
-              <a:defRPr sz="1800"/>
-            </a:pPr>
-            <a:r>
-              <a:t>Repeat from step 1</a:t>
-            </a:r>
-          </a:p>
-          <a:p>
-            <a:pPr>
-              <a:defRPr sz="1800"/>
-            </a:pPr>
-            <a:r>
-              <a:t>Stop when the response is complete</a:t>
-            </a:r>
-          </a:p>
-          <a:p>
-            <a:pPr>
-              <a:defRPr sz="1800"/>
-            </a:pPr>
-            <a:r>
-              <a:t>Like writing one word at a time, always reading what came before</a:t>
+              <a:t>From numbers to words</a:t>
+            </a:r>
+          </a:p>
+          <a:p>
+            <a:pPr>
+              <a:defRPr sz="1800"/>
+            </a:pPr>
+            <a:r>
+              <a:t>The chosen number becomes a word again</a:t>
+            </a:r>
+          </a:p>
+          <a:p>
+            <a:pPr>
+              <a:defRPr sz="1800"/>
+            </a:pPr>
+            <a:r>
+              <a:t>That word gets added to the response</a:t>
+            </a:r>
+          </a:p>
+          <a:p>
+            <a:pPr>
+              <a:defRPr sz="1800"/>
+            </a:pPr>
+            <a:r>
+              <a:t>The process repeats for the next word</a:t>
+            </a:r>
+          </a:p>
+          <a:p>
+            <a:pPr>
+              <a:defRPr sz="1800"/>
+            </a:pPr>
+            <a:r>
+              <a:t>Continues until the response is complete</a:t>
+            </a:r>
+          </a:p>
+          <a:p>
+            <a:pPr>
+              <a:defRPr sz="1800"/>
+            </a:pPr>
+            <a:r>
+              <a:t>Final result: the text you see</a:t>
             </a:r>
           </a:p>
         </p:txBody>
@@ -3642,6 +5035,120 @@
               <a:defRPr sz="3200" b="1"/>
             </a:pPr>
             <a:r>
+              <a:t>The Autoregressive Loop</a:t>
+            </a:r>
+          </a:p>
+        </p:txBody>
+      </p:sp>
+      <p:sp>
+        <p:nvSpPr>
+          <p:cNvPr id="3" name="Content Placeholder 2"/>
+          <p:cNvSpPr>
+            <a:spLocks noGrp="1"/>
+          </p:cNvSpPr>
+          <p:nvPr>
+            <p:ph idx="1"/>
+          </p:nvPr>
+        </p:nvSpPr>
+        <p:spPr/>
+        <p:txBody>
+          <a:bodyPr/>
+          <a:lstStyle/>
+          <a:p>
+            <a:pPr>
+              <a:defRPr sz="2000" b="1"/>
+            </a:pPr>
+            <a:r>
+              <a:t>How AI writes one word at a time</a:t>
+            </a:r>
+          </a:p>
+          <a:p>
+            <a:pPr>
+              <a:defRPr sz="1800"/>
+            </a:pPr>
+            <a:r>
+              <a:t>Read all the text so far</a:t>
+            </a:r>
+          </a:p>
+          <a:p>
+            <a:pPr>
+              <a:defRPr sz="1800"/>
+            </a:pPr>
+            <a:r>
+              <a:t>Predict the best next word</a:t>
+            </a:r>
+          </a:p>
+          <a:p>
+            <a:pPr>
+              <a:defRPr sz="1800"/>
+            </a:pPr>
+            <a:r>
+              <a:t>Add that word to the text</a:t>
+            </a:r>
+          </a:p>
+          <a:p>
+            <a:pPr>
+              <a:defRPr sz="1800"/>
+            </a:pPr>
+            <a:r>
+              <a:t>Repeat from step 1</a:t>
+            </a:r>
+          </a:p>
+          <a:p>
+            <a:pPr>
+              <a:defRPr sz="1800"/>
+            </a:pPr>
+            <a:r>
+              <a:t>Stop when the response is complete</a:t>
+            </a:r>
+          </a:p>
+          <a:p>
+            <a:pPr>
+              <a:defRPr sz="1800"/>
+            </a:pPr>
+            <a:r>
+              <a:t>Like writing one word at a time, always reading what came before</a:t>
+            </a:r>
+          </a:p>
+        </p:txBody>
+      </p:sp>
+    </p:spTree>
+  </p:cSld>
+  <p:clrMapOvr>
+    <a:masterClrMapping/>
+  </p:clrMapOvr>
+</p:sld>
+</file>
+
+<file path=ppt/slides/slide15.xml><?xml version="1.0" encoding="utf-8"?>
+<p:sld xmlns:a="http://schemas.openxmlformats.org/drawingml/2006/main" xmlns:p="http://schemas.openxmlformats.org/presentationml/2006/main" xmlns:r="http://schemas.openxmlformats.org/officeDocument/2006/relationships">
+  <p:cSld>
+    <p:spTree>
+      <p:nvGrpSpPr>
+        <p:cNvPr id="1" name=""/>
+        <p:cNvGrpSpPr/>
+        <p:nvPr/>
+      </p:nvGrpSpPr>
+      <p:grpSpPr/>
+      <p:sp>
+        <p:nvSpPr>
+          <p:cNvPr id="2" name="Title 1"/>
+          <p:cNvSpPr>
+            <a:spLocks noGrp="1"/>
+          </p:cNvSpPr>
+          <p:nvPr>
+            <p:ph type="title"/>
+          </p:nvPr>
+        </p:nvSpPr>
+        <p:spPr/>
+        <p:txBody>
+          <a:bodyPr/>
+          <a:lstStyle/>
+          <a:p>
+            <a:pPr>
+              <a:defRPr sz="3200" b="1"/>
+            </a:pPr>
+            <a:r>
               <a:t>The Big Picture</a:t>
             </a:r>
           </a:p>
@@ -3968,7 +5475,7 @@
               <a:defRPr sz="3200" b="1"/>
             </a:pPr>
             <a:r>
-              <a:t>Positional Encoding: Remembering Word Order</a:t>
+              <a:t>Embedding Vectors</a:t>
             </a:r>
           </a:p>
         </p:txBody>
@@ -3992,47 +5499,31 @@
               <a:defRPr sz="2000" b="1"/>
             </a:pPr>
             <a:r>
-              <a:t>Position matters</a:t>
-            </a:r>
-          </a:p>
-          <a:p>
-            <a:pPr>
-              <a:defRPr sz="1800"/>
-            </a:pPr>
-            <a:r>
-              <a:t>"Dog bites man" means something different than "Man bites dog"</a:t>
-            </a:r>
-          </a:p>
-          <a:p>
-            <a:pPr>
-              <a:defRPr sz="1800"/>
-            </a:pPr>
-            <a:r>
-              <a:t>AI needs to know which word came first, second, third</a:t>
-            </a:r>
-          </a:p>
-          <a:p>
-            <a:pPr>
-              <a:defRPr sz="1800"/>
-            </a:pPr>
-            <a:r>
-              <a:t>Special markers are added to remember position</a:t>
-            </a:r>
-          </a:p>
-          <a:p>
-            <a:pPr>
-              <a:defRPr sz="1800"/>
-            </a:pPr>
-            <a:r>
-              <a:t>Like numbering pages in a book</a:t>
-            </a:r>
-          </a:p>
-          <a:p>
-            <a:pPr>
-              <a:defRPr sz="1800"/>
-            </a:pPr>
-            <a:r>
-              <a:t>This helps maintain the meaning of sentences</a:t>
+              <a:t>Its all about the vectors</a:t>
+            </a:r>
+          </a:p>
+          <a:p>
+            <a:pPr>
+              <a:defRPr sz="1800"/>
+            </a:pPr>
+            <a:r>
+              <a:t>The rest of the process is about refining these vectors so that they encode the various relationship between tokens</a:t>
+            </a:r>
+          </a:p>
+          <a:p>
+            <a:pPr>
+              <a:defRPr sz="1800"/>
+            </a:pPr>
+            <a:r>
+              <a:t>The math is a bunch of linear algebra and matrix operations</a:t>
+            </a:r>
+          </a:p>
+          <a:p>
+            <a:pPr>
+              <a:defRPr sz="1800"/>
+            </a:pPr>
+            <a:r>
+              <a:t>In the end, these vectors are used to predict the next word</a:t>
             </a:r>
           </a:p>
         </p:txBody>
@@ -4074,7 +5565,7 @@
               <a:defRPr sz="3200" b="1"/>
             </a:pPr>
             <a:r>
-              <a:t>Transformr Blocks: The Thinking Layers</a:t>
+              <a:t>Positional Encoding: Remembering Word Order</a:t>
             </a:r>
           </a:p>
         </p:txBody>
@@ -4098,63 +5589,47 @@
               <a:defRPr sz="2000" b="1"/>
             </a:pPr>
             <a:r>
-              <a:t>Multiple levels of understanding</a:t>
-            </a:r>
-          </a:p>
-          <a:p>
-            <a:pPr>
-              <a:defRPr sz="1800"/>
-            </a:pPr>
-            <a:r>
-              <a:t>The AI has many layers stacked on top of each other</a:t>
-            </a:r>
-          </a:p>
-          <a:p>
-            <a:pPr>
-              <a:defRPr sz="1800"/>
-            </a:pPr>
-            <a:r>
-              <a:t>Like floors in a building</a:t>
-            </a:r>
-          </a:p>
-          <a:p>
-            <a:pPr>
-              <a:defRPr sz="1800"/>
-            </a:pPr>
-            <a:r>
-              <a:t>Each layer understands the text a bit deeper</a:t>
-            </a:r>
-          </a:p>
-          <a:p>
-            <a:pPr>
-              <a:defRPr sz="1800"/>
-            </a:pPr>
-            <a:r>
-              <a:t>Bottom layers: basic grammar and word patterns</a:t>
-            </a:r>
-          </a:p>
-          <a:p>
-            <a:pPr>
-              <a:defRPr sz="1800"/>
-            </a:pPr>
-            <a:r>
-              <a:t>Top layers: complex ideas and reasoning</a:t>
-            </a:r>
-          </a:p>
-          <a:p>
-            <a:pPr>
-              <a:defRPr sz="1800"/>
-            </a:pPr>
-            <a:r>
-              <a:t>More layers = smarter AI</a:t>
-            </a:r>
-          </a:p>
-          <a:p>
-            <a:pPr>
-              <a:defRPr sz="1800"/>
-            </a:pPr>
-            <a:r>
-              <a:t>Attention-&gt;Neural Network-&gt;Normalization</a:t>
+              <a:t>Position matters</a:t>
+            </a:r>
+          </a:p>
+          <a:p>
+            <a:pPr>
+              <a:defRPr sz="1800"/>
+            </a:pPr>
+            <a:r>
+              <a:t>"Dog bites man" means something different than "Man bites dog"</a:t>
+            </a:r>
+          </a:p>
+          <a:p>
+            <a:pPr>
+              <a:defRPr sz="1800"/>
+            </a:pPr>
+            <a:r>
+              <a:t>AI needs to know which word came first, second, third</a:t>
+            </a:r>
+          </a:p>
+          <a:p>
+            <a:pPr>
+              <a:defRPr sz="1800"/>
+            </a:pPr>
+            <a:r>
+              <a:t>Special markers are added to remember position</a:t>
+            </a:r>
+          </a:p>
+          <a:p>
+            <a:pPr>
+              <a:defRPr sz="1800"/>
+            </a:pPr>
+            <a:r>
+              <a:t>Like numbering pages in a book</a:t>
+            </a:r>
+          </a:p>
+          <a:p>
+            <a:pPr>
+              <a:defRPr sz="1800"/>
+            </a:pPr>
+            <a:r>
+              <a:t>This helps maintain the meaning of sentences</a:t>
             </a:r>
           </a:p>
         </p:txBody>
@@ -4195,6 +5670,9 @@
             <a:pPr>
               <a:defRPr sz="3200" b="1"/>
             </a:pPr>
+            <a:r>
+              <a:t>Transformr Blocks: The Thinking Layers</a:t>
+            </a:r>
           </a:p>
         </p:txBody>
       </p:sp>
@@ -4214,58 +5692,66 @@
           <a:lstStyle/>
           <a:p>
             <a:pPr>
-              <a:defRPr sz="1800"/>
-            </a:pPr>
-            <a:r>
-              <a:t>#### Attention: Looking at Context</a:t>
-            </a:r>
-          </a:p>
-          <a:p>
-            <a:pPr>
               <a:defRPr sz="2000" b="1"/>
             </a:pPr>
             <a:r>
-              <a:t>Understanding connections</a:t>
-            </a:r>
-          </a:p>
-          <a:p>
-            <a:pPr>
-              <a:defRPr sz="1800"/>
-            </a:pPr>
-            <a:r>
-              <a:t>**Each word looks at every other word** in the sentence</a:t>
-            </a:r>
-          </a:p>
-          <a:p>
-            <a:pPr>
-              <a:defRPr sz="1800"/>
-            </a:pPr>
-            <a:r>
-              <a:t>The AI asks: "How does this word relate to that word?"</a:t>
-            </a:r>
-          </a:p>
-          <a:p>
-            <a:pPr>
-              <a:defRPr sz="1800"/>
-            </a:pPr>
-            <a:r>
-              <a:t>Multiple "attention heads" focus on different relationships</a:t>
-            </a:r>
-          </a:p>
-          <a:p>
-            <a:pPr>
-              <a:defRPr sz="1800"/>
-            </a:pPr>
-            <a:r>
-              <a:t>Example: In "The dog was tired," the AI connects "tired" back to "dog"</a:t>
-            </a:r>
-          </a:p>
-          <a:p>
-            <a:pPr>
-              <a:defRPr sz="1800"/>
-            </a:pPr>
-            <a:r>
-              <a:t>This is how AI understands context</a:t>
+              <a:t>Multiple levels of understanding</a:t>
+            </a:r>
+          </a:p>
+          <a:p>
+            <a:pPr>
+              <a:defRPr sz="1800"/>
+            </a:pPr>
+            <a:r>
+              <a:t>The AI has many layers stacked on top of each other</a:t>
+            </a:r>
+          </a:p>
+          <a:p>
+            <a:pPr>
+              <a:defRPr sz="1800"/>
+            </a:pPr>
+            <a:r>
+              <a:t>Like floors in a building</a:t>
+            </a:r>
+          </a:p>
+          <a:p>
+            <a:pPr>
+              <a:defRPr sz="1800"/>
+            </a:pPr>
+            <a:r>
+              <a:t>Each layer understands the text a bit deeper</a:t>
+            </a:r>
+          </a:p>
+          <a:p>
+            <a:pPr>
+              <a:defRPr sz="1800"/>
+            </a:pPr>
+            <a:r>
+              <a:t>Bottom layers: basic grammar and word patterns</a:t>
+            </a:r>
+          </a:p>
+          <a:p>
+            <a:pPr>
+              <a:defRPr sz="1800"/>
+            </a:pPr>
+            <a:r>
+              <a:t>Top layers: complex ideas and reasoning</a:t>
+            </a:r>
+          </a:p>
+          <a:p>
+            <a:pPr>
+              <a:defRPr sz="1800"/>
+            </a:pPr>
+            <a:r>
+              <a:t>More layers = smarter AI</a:t>
+            </a:r>
+          </a:p>
+          <a:p>
+            <a:pPr>
+              <a:defRPr sz="1800"/>
+            </a:pPr>
+            <a:r>
+              <a:t>Attention-&gt;Neural Network-&gt;Normalization</a:t>
             </a:r>
           </a:p>
         </p:txBody>
@@ -4328,7 +5814,7 @@
               <a:defRPr sz="1800"/>
             </a:pPr>
             <a:r>
-              <a:t>#### Feed Forward Neural Network: Processing Information</a:t>
+              <a:t>#### Attention: Looking at Context</a:t>
             </a:r>
           </a:p>
           <a:p>
@@ -4336,47 +5822,47 @@
               <a:defRPr sz="2000" b="1"/>
             </a:pPr>
             <a:r>
-              <a:t>Transforming understanding</a:t>
-            </a:r>
-          </a:p>
-          <a:p>
-            <a:pPr>
-              <a:defRPr sz="1800"/>
-            </a:pPr>
-            <a:r>
-              <a:t>After understanding connections, each word gets processed individually</a:t>
-            </a:r>
-          </a:p>
-          <a:p>
-            <a:pPr>
-              <a:defRPr sz="1800"/>
-            </a:pPr>
-            <a:r>
-              <a:t>Think of it like a filter that enhances certain features</a:t>
-            </a:r>
-          </a:p>
-          <a:p>
-            <a:pPr>
-              <a:defRPr sz="1800"/>
-            </a:pPr>
-            <a:r>
-              <a:t>Makes the understanding richer and more detailed</a:t>
-            </a:r>
-          </a:p>
-          <a:p>
-            <a:pPr>
-              <a:defRPr sz="1800"/>
-            </a:pPr>
-            <a:r>
-              <a:t>Happens at every layer</a:t>
-            </a:r>
-          </a:p>
-          <a:p>
-            <a:pPr>
-              <a:defRPr sz="1800"/>
-            </a:pPr>
-            <a:r>
-              <a:t>Combines with context understanding for full meaning</a:t>
+              <a:t>Understanding connections</a:t>
+            </a:r>
+          </a:p>
+          <a:p>
+            <a:pPr>
+              <a:defRPr sz="1800"/>
+            </a:pPr>
+            <a:r>
+              <a:t>**Each word looks at every other word** in the sentence</a:t>
+            </a:r>
+          </a:p>
+          <a:p>
+            <a:pPr>
+              <a:defRPr sz="1800"/>
+            </a:pPr>
+            <a:r>
+              <a:t>The AI asks: "How does this word relate to that word?"</a:t>
+            </a:r>
+          </a:p>
+          <a:p>
+            <a:pPr>
+              <a:defRPr sz="1800"/>
+            </a:pPr>
+            <a:r>
+              <a:t>Multiple "attention heads" focus on different relationships</a:t>
+            </a:r>
+          </a:p>
+          <a:p>
+            <a:pPr>
+              <a:defRPr sz="1800"/>
+            </a:pPr>
+            <a:r>
+              <a:t>Example: In "The dog was tired," the AI connects "tired" back to "dog"</a:t>
+            </a:r>
+          </a:p>
+          <a:p>
+            <a:pPr>
+              <a:defRPr sz="1800"/>
+            </a:pPr>
+            <a:r>
+              <a:t>This is how AI understands context</a:t>
             </a:r>
           </a:p>
         </p:txBody>
@@ -4439,7 +5925,7 @@
               <a:defRPr sz="1800"/>
             </a:pPr>
             <a:r>
-              <a:t>#### Normalization: Keeping Things Stable</a:t>
+              <a:t>#### Feed Forward Neural Network: Processing Information</a:t>
             </a:r>
           </a:p>
           <a:p>
@@ -4447,47 +5933,47 @@
               <a:defRPr sz="2000" b="1"/>
             </a:pPr>
             <a:r>
-              <a:t>Maintaining consistency</a:t>
-            </a:r>
-          </a:p>
-          <a:p>
-            <a:pPr>
-              <a:defRPr sz="1800"/>
-            </a:pPr>
-            <a:r>
-              <a:t>With so many layers, things could get messy</a:t>
-            </a:r>
-          </a:p>
-          <a:p>
-            <a:pPr>
-              <a:defRPr sz="1800"/>
-            </a:pPr>
-            <a:r>
-              <a:t>Special techniques keep the data organized</a:t>
-            </a:r>
-          </a:p>
-          <a:p>
-            <a:pPr>
-              <a:defRPr sz="1800"/>
-            </a:pPr>
-            <a:r>
-              <a:t>Like a quality control check at each step</a:t>
-            </a:r>
-          </a:p>
-          <a:p>
-            <a:pPr>
-              <a:defRPr sz="1800"/>
-            </a:pPr>
-            <a:r>
-              <a:t>Ensures the AI doesn't get confused</a:t>
-            </a:r>
-          </a:p>
-          <a:p>
-            <a:pPr>
-              <a:defRPr sz="1800"/>
-            </a:pPr>
-            <a:r>
-              <a:t>Allows for very deep, complex models</a:t>
+              <a:t>Transforming understanding</a:t>
+            </a:r>
+          </a:p>
+          <a:p>
+            <a:pPr>
+              <a:defRPr sz="1800"/>
+            </a:pPr>
+            <a:r>
+              <a:t>After understanding connections, each word gets processed individually</a:t>
+            </a:r>
+          </a:p>
+          <a:p>
+            <a:pPr>
+              <a:defRPr sz="1800"/>
+            </a:pPr>
+            <a:r>
+              <a:t>Think of it like a filter that enhances certain features</a:t>
+            </a:r>
+          </a:p>
+          <a:p>
+            <a:pPr>
+              <a:defRPr sz="1800"/>
+            </a:pPr>
+            <a:r>
+              <a:t>Makes the understanding richer and more detailed</a:t>
+            </a:r>
+          </a:p>
+          <a:p>
+            <a:pPr>
+              <a:defRPr sz="1800"/>
+            </a:pPr>
+            <a:r>
+              <a:t>Happens at every layer</a:t>
+            </a:r>
+          </a:p>
+          <a:p>
+            <a:pPr>
+              <a:defRPr sz="1800"/>
+            </a:pPr>
+            <a:r>
+              <a:t>Combines with context understanding for full meaning</a:t>
             </a:r>
           </a:p>
         </p:txBody>
@@ -4528,9 +6014,6 @@
             <a:pPr>
               <a:defRPr sz="3200" b="1"/>
             </a:pPr>
-            <a:r>
-              <a:t>Projection: Preparing Predictions</a:t>
-            </a:r>
           </a:p>
         </p:txBody>
       </p:sp>
@@ -4550,50 +6033,58 @@
           <a:lstStyle/>
           <a:p>
             <a:pPr>
+              <a:defRPr sz="1800"/>
+            </a:pPr>
+            <a:r>
+              <a:t>#### Normalization: Keeping Things Stable</a:t>
+            </a:r>
+          </a:p>
+          <a:p>
+            <a:pPr>
               <a:defRPr sz="2000" b="1"/>
             </a:pPr>
             <a:r>
-              <a:t>Getting ready to respond</a:t>
-            </a:r>
-          </a:p>
-          <a:p>
-            <a:pPr>
-              <a:defRPr sz="1800"/>
-            </a:pPr>
-            <a:r>
-              <a:t>The final understanding gets converted to possible next words</a:t>
-            </a:r>
-          </a:p>
-          <a:p>
-            <a:pPr>
-              <a:defRPr sz="1800"/>
-            </a:pPr>
-            <a:r>
-              <a:t>Every word in the vocabulary gets a score</a:t>
-            </a:r>
-          </a:p>
-          <a:p>
-            <a:pPr>
-              <a:defRPr sz="1800"/>
-            </a:pPr>
-            <a:r>
-              <a:t>Higher score = more likely to be the next word</a:t>
-            </a:r>
-          </a:p>
-          <a:p>
-            <a:pPr>
-              <a:defRPr sz="1800"/>
-            </a:pPr>
-            <a:r>
-              <a:t>Like having thousands of options ranked by confidence</a:t>
-            </a:r>
-          </a:p>
-          <a:p>
-            <a:pPr>
-              <a:defRPr sz="1800"/>
-            </a:pPr>
-            <a:r>
-              <a:t>This creates a list of possibilities</a:t>
+              <a:t>Maintaining consistency</a:t>
+            </a:r>
+          </a:p>
+          <a:p>
+            <a:pPr>
+              <a:defRPr sz="1800"/>
+            </a:pPr>
+            <a:r>
+              <a:t>With so many layers, things could get messy</a:t>
+            </a:r>
+          </a:p>
+          <a:p>
+            <a:pPr>
+              <a:defRPr sz="1800"/>
+            </a:pPr>
+            <a:r>
+              <a:t>Special techniques keep the data organized</a:t>
+            </a:r>
+          </a:p>
+          <a:p>
+            <a:pPr>
+              <a:defRPr sz="1800"/>
+            </a:pPr>
+            <a:r>
+              <a:t>Like a quality control check at each step</a:t>
+            </a:r>
+          </a:p>
+          <a:p>
+            <a:pPr>
+              <a:defRPr sz="1800"/>
+            </a:pPr>
+            <a:r>
+              <a:t>Ensures the AI doesn't get confused</a:t>
+            </a:r>
+          </a:p>
+          <a:p>
+            <a:pPr>
+              <a:defRPr sz="1800"/>
+            </a:pPr>
+            <a:r>
+              <a:t>Allows for very deep, complex models</a:t>
             </a:r>
           </a:p>
         </p:txBody>
@@ -4924,4 +6415,324 @@
   </a:objectDefaults>
   <a:extraClrSchemeLst/>
 </a:theme>
+</file>
+
+<file path=ppt/theme/theme2.xml><?xml version="1.0" encoding="utf-8"?>
+<a:theme xmlns:a="http://schemas.openxmlformats.org/drawingml/2006/main" name="Office Theme">
+  <a:themeElements>
+    <a:clrScheme name="Office">
+      <a:dk1>
+        <a:sysClr val="windowText" lastClr="000000"/>
+      </a:dk1>
+      <a:lt1>
+        <a:sysClr val="window" lastClr="FFFFFF"/>
+      </a:lt1>
+      <a:dk2>
+        <a:srgbClr val="1F497D"/>
+      </a:dk2>
+      <a:lt2>
+        <a:srgbClr val="EEECE1"/>
+      </a:lt2>
+      <a:accent1>
+        <a:srgbClr val="4F81BD"/>
+      </a:accent1>
+      <a:accent2>
+        <a:srgbClr val="C0504D"/>
+      </a:accent2>
+      <a:accent3>
+        <a:srgbClr val="9BBB59"/>
+      </a:accent3>
+      <a:accent4>
+        <a:srgbClr val="8064A2"/>
+      </a:accent4>
+      <a:accent5>
+        <a:srgbClr val="4BACC6"/>
+      </a:accent5>
+      <a:accent6>
+        <a:srgbClr val="F79646"/>
+      </a:accent6>
+      <a:hlink>
+        <a:srgbClr val="0000FF"/>
+      </a:hlink>
+      <a:folHlink>
+        <a:srgbClr val="800080"/>
+      </a:folHlink>
+    </a:clrScheme>
+    <a:fontScheme name="Office">
+      <a:majorFont>
+        <a:latin typeface="Calibri"/>
+        <a:ea typeface=""/>
+        <a:cs typeface=""/>
+        <a:font script="Jpan" typeface="ＭＳ Ｐゴシック"/>
+        <a:font script="Hang" typeface="맑은 고딕"/>
+        <a:font script="Hans" typeface="宋体"/>
+        <a:font script="Hant" typeface="新細明體"/>
+        <a:font script="Arab" typeface="Times New Roman"/>
+        <a:font script="Hebr" typeface="Times New Roman"/>
+        <a:font script="Thai" typeface="Angsana New"/>
+        <a:font script="Ethi" typeface="Nyala"/>
+        <a:font script="Beng" typeface="Vrinda"/>
+        <a:font script="Gujr" typeface="Shruti"/>
+        <a:font script="Khmr" typeface="MoolBoran"/>
+        <a:font script="Knda" typeface="Tunga"/>
+        <a:font script="Guru" typeface="Raavi"/>
+        <a:font script="Cans" typeface="Euphemia"/>
+        <a:font script="Cher" typeface="Plantagenet Cherokee"/>
+        <a:font script="Yiii" typeface="Microsoft Yi Baiti"/>
+        <a:font script="Tibt" typeface="Microsoft Himalaya"/>
+        <a:font script="Thaa" typeface="MV Boli"/>
+        <a:font script="Deva" typeface="Mangal"/>
+        <a:font script="Telu" typeface="Gautami"/>
+        <a:font script="Taml" typeface="Latha"/>
+        <a:font script="Syrc" typeface="Estrangelo Edessa"/>
+        <a:font script="Orya" typeface="Kalinga"/>
+        <a:font script="Mlym" typeface="Kartika"/>
+        <a:font script="Laoo" typeface="DokChampa"/>
+        <a:font script="Sinh" typeface="Iskoola Pota"/>
+        <a:font script="Mong" typeface="Mongolian Baiti"/>
+        <a:font script="Viet" typeface="Times New Roman"/>
+        <a:font script="Uigh" typeface="Microsoft Uighur"/>
+        <a:font script="Geor" typeface="Sylfaen"/>
+      </a:majorFont>
+      <a:minorFont>
+        <a:latin typeface="Calibri"/>
+        <a:ea typeface=""/>
+        <a:cs typeface=""/>
+        <a:font script="Jpan" typeface="ＭＳ Ｐゴシック"/>
+        <a:font script="Hang" typeface="맑은 고딕"/>
+        <a:font script="Hans" typeface="宋体"/>
+        <a:font script="Hant" typeface="新細明體"/>
+        <a:font script="Arab" typeface="Arial"/>
+        <a:font script="Hebr" typeface="Arial"/>
+        <a:font script="Thai" typeface="Cordia New"/>
+        <a:font script="Ethi" typeface="Nyala"/>
+        <a:font script="Beng" typeface="Vrinda"/>
+        <a:font script="Gujr" typeface="Shruti"/>
+        <a:font script="Khmr" typeface="DaunPenh"/>
+        <a:font script="Knda" typeface="Tunga"/>
+        <a:font script="Guru" typeface="Raavi"/>
+        <a:font script="Cans" typeface="Euphemia"/>
+        <a:font script="Cher" typeface="Plantagenet Cherokee"/>
+        <a:font script="Yiii" typeface="Microsoft Yi Baiti"/>
+        <a:font script="Tibt" typeface="Microsoft Himalaya"/>
+        <a:font script="Thaa" typeface="MV Boli"/>
+        <a:font script="Deva" typeface="Mangal"/>
+        <a:font script="Telu" typeface="Gautami"/>
+        <a:font script="Taml" typeface="Latha"/>
+        <a:font script="Syrc" typeface="Estrangelo Edessa"/>
+        <a:font script="Orya" typeface="Kalinga"/>
+        <a:font script="Mlym" typeface="Kartika"/>
+        <a:font script="Laoo" typeface="DokChampa"/>
+        <a:font script="Sinh" typeface="Iskoola Pota"/>
+        <a:font script="Mong" typeface="Mongolian Baiti"/>
+        <a:font script="Viet" typeface="Arial"/>
+        <a:font script="Uigh" typeface="Microsoft Uighur"/>
+        <a:font script="Geor" typeface="Sylfaen"/>
+      </a:minorFont>
+    </a:fontScheme>
+    <a:fmtScheme name="Office">
+      <a:fillStyleLst>
+        <a:solidFill>
+          <a:schemeClr val="phClr"/>
+        </a:solidFill>
+        <a:gradFill rotWithShape="1">
+          <a:gsLst>
+            <a:gs pos="0">
+              <a:schemeClr val="phClr">
+                <a:tint val="50000"/>
+                <a:satMod val="300000"/>
+              </a:schemeClr>
+            </a:gs>
+            <a:gs pos="35000">
+              <a:schemeClr val="phClr">
+                <a:tint val="37000"/>
+                <a:satMod val="300000"/>
+              </a:schemeClr>
+            </a:gs>
+            <a:gs pos="100000">
+              <a:schemeClr val="phClr">
+                <a:tint val="15000"/>
+                <a:satMod val="350000"/>
+              </a:schemeClr>
+            </a:gs>
+          </a:gsLst>
+          <a:lin ang="16200000" scaled="1"/>
+        </a:gradFill>
+        <a:gradFill rotWithShape="1">
+          <a:gsLst>
+            <a:gs pos="0">
+              <a:schemeClr val="phClr">
+                <a:tint val="100000"/>
+                <a:shade val="100000"/>
+                <a:satMod val="130000"/>
+              </a:schemeClr>
+            </a:gs>
+            <a:gs pos="100000">
+              <a:schemeClr val="phClr">
+                <a:tint val="50000"/>
+                <a:shade val="100000"/>
+                <a:satMod val="350000"/>
+              </a:schemeClr>
+            </a:gs>
+          </a:gsLst>
+          <a:lin ang="16200000" scaled="0"/>
+        </a:gradFill>
+      </a:fillStyleLst>
+      <a:lnStyleLst>
+        <a:ln w="9525" cap="flat" cmpd="sng" algn="ctr">
+          <a:solidFill>
+            <a:schemeClr val="phClr">
+              <a:shade val="95000"/>
+              <a:satMod val="105000"/>
+            </a:schemeClr>
+          </a:solidFill>
+          <a:prstDash val="solid"/>
+        </a:ln>
+        <a:ln w="25400" cap="flat" cmpd="sng" algn="ctr">
+          <a:solidFill>
+            <a:schemeClr val="phClr"/>
+          </a:solidFill>
+          <a:prstDash val="solid"/>
+        </a:ln>
+        <a:ln w="38100" cap="flat" cmpd="sng" algn="ctr">
+          <a:solidFill>
+            <a:schemeClr val="phClr"/>
+          </a:solidFill>
+          <a:prstDash val="solid"/>
+        </a:ln>
+      </a:lnStyleLst>
+      <a:effectStyleLst>
+        <a:effectStyle>
+          <a:effectLst>
+            <a:outerShdw blurRad="40000" dist="20000" dir="5400000" rotWithShape="0">
+              <a:srgbClr val="000000">
+                <a:alpha val="38000"/>
+              </a:srgbClr>
+            </a:outerShdw>
+          </a:effectLst>
+        </a:effectStyle>
+        <a:effectStyle>
+          <a:effectLst>
+            <a:outerShdw blurRad="40000" dist="23000" dir="5400000" rotWithShape="0">
+              <a:srgbClr val="000000">
+                <a:alpha val="35000"/>
+              </a:srgbClr>
+            </a:outerShdw>
+          </a:effectLst>
+        </a:effectStyle>
+        <a:effectStyle>
+          <a:effectLst>
+            <a:outerShdw blurRad="40000" dist="23000" dir="5400000" rotWithShape="0">
+              <a:srgbClr val="000000">
+                <a:alpha val="35000"/>
+              </a:srgbClr>
+            </a:outerShdw>
+          </a:effectLst>
+          <a:scene3d>
+            <a:camera prst="orthographicFront">
+              <a:rot lat="0" lon="0" rev="0"/>
+            </a:camera>
+            <a:lightRig rig="threePt" dir="t">
+              <a:rot lat="0" lon="0" rev="1200000"/>
+            </a:lightRig>
+          </a:scene3d>
+          <a:sp3d>
+            <a:bevelT w="63500" h="25400"/>
+          </a:sp3d>
+        </a:effectStyle>
+      </a:effectStyleLst>
+      <a:bgFillStyleLst>
+        <a:solidFill>
+          <a:schemeClr val="phClr"/>
+        </a:solidFill>
+        <a:gradFill rotWithShape="1">
+          <a:gsLst>
+            <a:gs pos="0">
+              <a:schemeClr val="phClr">
+                <a:tint val="40000"/>
+                <a:satMod val="350000"/>
+              </a:schemeClr>
+            </a:gs>
+            <a:gs pos="40000">
+              <a:schemeClr val="phClr">
+                <a:tint val="45000"/>
+                <a:shade val="99000"/>
+                <a:satMod val="350000"/>
+              </a:schemeClr>
+            </a:gs>
+            <a:gs pos="100000">
+              <a:schemeClr val="phClr">
+                <a:shade val="20000"/>
+                <a:satMod val="255000"/>
+              </a:schemeClr>
+            </a:gs>
+          </a:gsLst>
+          <a:path path="circle">
+            <a:fillToRect l="50000" t="-80000" r="50000" b="180000"/>
+          </a:path>
+        </a:gradFill>
+        <a:gradFill rotWithShape="1">
+          <a:gsLst>
+            <a:gs pos="0">
+              <a:schemeClr val="phClr">
+                <a:tint val="80000"/>
+                <a:satMod val="300000"/>
+              </a:schemeClr>
+            </a:gs>
+            <a:gs pos="100000">
+              <a:schemeClr val="phClr">
+                <a:shade val="30000"/>
+                <a:satMod val="200000"/>
+              </a:schemeClr>
+            </a:gs>
+          </a:gsLst>
+          <a:path path="circle">
+            <a:fillToRect l="50000" t="50000" r="50000" b="50000"/>
+          </a:path>
+        </a:gradFill>
+      </a:bgFillStyleLst>
+    </a:fmtScheme>
+  </a:themeElements>
+  <a:objectDefaults>
+    <a:spDef>
+      <a:spPr/>
+      <a:bodyPr/>
+      <a:lstStyle/>
+      <a:style>
+        <a:lnRef idx="1">
+          <a:schemeClr val="accent1"/>
+        </a:lnRef>
+        <a:fillRef idx="3">
+          <a:schemeClr val="accent1"/>
+        </a:fillRef>
+        <a:effectRef idx="2">
+          <a:schemeClr val="accent1"/>
+        </a:effectRef>
+        <a:fontRef idx="minor">
+          <a:schemeClr val="lt1"/>
+        </a:fontRef>
+      </a:style>
+    </a:spDef>
+    <a:lnDef>
+      <a:spPr/>
+      <a:bodyPr/>
+      <a:lstStyle/>
+      <a:style>
+        <a:lnRef idx="2">
+          <a:schemeClr val="accent1"/>
+        </a:lnRef>
+        <a:fillRef idx="0">
+          <a:schemeClr val="accent1"/>
+        </a:fillRef>
+        <a:effectRef idx="1">
+          <a:schemeClr val="accent1"/>
+        </a:effectRef>
+        <a:fontRef idx="minor">
+          <a:schemeClr val="tx1"/>
+        </a:fontRef>
+      </a:style>
+    </a:lnDef>
+  </a:objectDefaults>
+  <a:extraClrSchemeLst/>
+</a:theme>
 </file>
</xml_diff>